<commit_message>
add images to powerpoint
</commit_message>
<xml_diff>
--- a/NCME.pptx
+++ b/NCME.pptx
@@ -6,10 +6,10 @@
     <p:sldMasterId id="2147484059" r:id="rId5"/>
   </p:sldMasterIdLst>
   <p:notesMasterIdLst>
-    <p:notesMasterId r:id="rId24"/>
+    <p:notesMasterId r:id="rId20"/>
   </p:notesMasterIdLst>
   <p:handoutMasterIdLst>
-    <p:handoutMasterId r:id="rId25"/>
+    <p:handoutMasterId r:id="rId21"/>
   </p:handoutMasterIdLst>
   <p:sldIdLst>
     <p:sldId id="518" r:id="rId6"/>
@@ -22,14 +22,10 @@
     <p:sldId id="520" r:id="rId13"/>
     <p:sldId id="521" r:id="rId14"/>
     <p:sldId id="492" r:id="rId15"/>
-    <p:sldId id="428" r:id="rId16"/>
-    <p:sldId id="456" r:id="rId17"/>
-    <p:sldId id="425" r:id="rId18"/>
-    <p:sldId id="512" r:id="rId19"/>
-    <p:sldId id="403" r:id="rId20"/>
-    <p:sldId id="499" r:id="rId21"/>
-    <p:sldId id="437" r:id="rId22"/>
-    <p:sldId id="519" r:id="rId23"/>
+    <p:sldId id="523" r:id="rId16"/>
+    <p:sldId id="524" r:id="rId17"/>
+    <p:sldId id="512" r:id="rId18"/>
+    <p:sldId id="437" r:id="rId19"/>
   </p:sldIdLst>
   <p:sldSz cx="9144000" cy="6858000" type="screen4x3"/>
   <p:notesSz cx="7023100" cy="9309100"/>
@@ -208,7 +204,7 @@
 <file path=ppt/revisionInfo.xml><?xml version="1.0" encoding="utf-8"?>
 <p1510:revInfo xmlns:a="http://schemas.openxmlformats.org/drawingml/2006/main" xmlns:r="http://schemas.openxmlformats.org/officeDocument/2006/relationships" xmlns:p1510="http://schemas.microsoft.com/office/powerpoint/2015/10/main">
   <p1510:revLst>
-    <p1510:client id="{88817176-AB74-4534-BCC2-357A353134DD}" v="5" dt="2024-02-27T18:13:21.853"/>
+    <p1510:client id="{88817176-AB74-4534-BCC2-357A353134DD}" v="9" dt="2024-02-28T23:16:39.484"/>
   </p1510:revLst>
 </p1510:revInfo>
 </file>
@@ -218,10 +214,17 @@
   <pc:docChgLst>
     <pc:chgData name="Yi, Karen" userId="810c5928-e019-4621-9085-23289459b576" providerId="ADAL" clId="{88817176-AB74-4534-BCC2-357A353134DD}"/>
     <pc:docChg chg="undo custSel addSld delSld modSld sldOrd">
-      <pc:chgData name="Yi, Karen" userId="810c5928-e019-4621-9085-23289459b576" providerId="ADAL" clId="{88817176-AB74-4534-BCC2-357A353134DD}" dt="2024-02-28T22:20:26.094" v="1466" actId="47"/>
+      <pc:chgData name="Yi, Karen" userId="810c5928-e019-4621-9085-23289459b576" providerId="ADAL" clId="{88817176-AB74-4534-BCC2-357A353134DD}" dt="2024-02-28T23:27:20.024" v="2387" actId="20577"/>
       <pc:docMkLst>
         <pc:docMk/>
       </pc:docMkLst>
+      <pc:sldChg chg="del">
+        <pc:chgData name="Yi, Karen" userId="810c5928-e019-4621-9085-23289459b576" providerId="ADAL" clId="{88817176-AB74-4534-BCC2-357A353134DD}" dt="2024-02-28T22:21:56.372" v="1474" actId="47"/>
+        <pc:sldMkLst>
+          <pc:docMk/>
+          <pc:sldMk cId="290358487" sldId="403"/>
+        </pc:sldMkLst>
+      </pc:sldChg>
       <pc:sldChg chg="modSp mod">
         <pc:chgData name="Yi, Karen" userId="810c5928-e019-4621-9085-23289459b576" providerId="ADAL" clId="{88817176-AB74-4534-BCC2-357A353134DD}" dt="2024-02-27T18:07:30.922" v="763" actId="6549"/>
         <pc:sldMkLst>
@@ -284,6 +287,43 @@
         </pc:sldMkLst>
       </pc:sldChg>
       <pc:sldChg chg="del">
+        <pc:chgData name="Yi, Karen" userId="810c5928-e019-4621-9085-23289459b576" providerId="ADAL" clId="{88817176-AB74-4534-BCC2-357A353134DD}" dt="2024-02-28T22:21:37.238" v="1469" actId="47"/>
+        <pc:sldMkLst>
+          <pc:docMk/>
+          <pc:sldMk cId="2329634097" sldId="425"/>
+        </pc:sldMkLst>
+      </pc:sldChg>
+      <pc:sldChg chg="del">
+        <pc:chgData name="Yi, Karen" userId="810c5928-e019-4621-9085-23289459b576" providerId="ADAL" clId="{88817176-AB74-4534-BCC2-357A353134DD}" dt="2024-02-28T22:21:35.488" v="1468" actId="47"/>
+        <pc:sldMkLst>
+          <pc:docMk/>
+          <pc:sldMk cId="1884256070" sldId="428"/>
+        </pc:sldMkLst>
+      </pc:sldChg>
+      <pc:sldChg chg="modSp mod">
+        <pc:chgData name="Yi, Karen" userId="810c5928-e019-4621-9085-23289459b576" providerId="ADAL" clId="{88817176-AB74-4534-BCC2-357A353134DD}" dt="2024-02-28T22:23:44.857" v="1636" actId="20577"/>
+        <pc:sldMkLst>
+          <pc:docMk/>
+          <pc:sldMk cId="3725530701" sldId="437"/>
+        </pc:sldMkLst>
+        <pc:spChg chg="mod">
+          <ac:chgData name="Yi, Karen" userId="810c5928-e019-4621-9085-23289459b576" providerId="ADAL" clId="{88817176-AB74-4534-BCC2-357A353134DD}" dt="2024-02-28T22:23:37.061" v="1635" actId="20577"/>
+          <ac:spMkLst>
+            <pc:docMk/>
+            <pc:sldMk cId="3725530701" sldId="437"/>
+            <ac:spMk id="2" creationId="{C89DBA57-6688-4108-A0F9-CAA742F90FE7}"/>
+          </ac:spMkLst>
+        </pc:spChg>
+        <pc:spChg chg="mod">
+          <ac:chgData name="Yi, Karen" userId="810c5928-e019-4621-9085-23289459b576" providerId="ADAL" clId="{88817176-AB74-4534-BCC2-357A353134DD}" dt="2024-02-28T22:23:44.857" v="1636" actId="20577"/>
+          <ac:spMkLst>
+            <pc:docMk/>
+            <pc:sldMk cId="3725530701" sldId="437"/>
+            <ac:spMk id="3" creationId="{0333826F-C77B-46BA-9AD2-B7409A44C7DB}"/>
+          </ac:spMkLst>
+        </pc:spChg>
+      </pc:sldChg>
+      <pc:sldChg chg="del">
         <pc:chgData name="Yi, Karen" userId="810c5928-e019-4621-9085-23289459b576" providerId="ADAL" clId="{88817176-AB74-4534-BCC2-357A353134DD}" dt="2024-02-28T22:20:20.857" v="1464" actId="47"/>
         <pc:sldMkLst>
           <pc:docMk/>
@@ -317,6 +357,13 @@
         <pc:sldMkLst>
           <pc:docMk/>
           <pc:sldMk cId="492699153" sldId="453"/>
+        </pc:sldMkLst>
+      </pc:sldChg>
+      <pc:sldChg chg="del">
+        <pc:chgData name="Yi, Karen" userId="810c5928-e019-4621-9085-23289459b576" providerId="ADAL" clId="{88817176-AB74-4534-BCC2-357A353134DD}" dt="2024-02-28T22:21:34.737" v="1467" actId="47"/>
+        <pc:sldMkLst>
+          <pc:docMk/>
+          <pc:sldMk cId="2616861563" sldId="456"/>
         </pc:sldMkLst>
       </pc:sldChg>
       <pc:sldChg chg="modSp mod ord">
@@ -542,6 +589,13 @@
         </pc:sldMkLst>
       </pc:sldChg>
       <pc:sldChg chg="del">
+        <pc:chgData name="Yi, Karen" userId="810c5928-e019-4621-9085-23289459b576" providerId="ADAL" clId="{88817176-AB74-4534-BCC2-357A353134DD}" dt="2024-02-28T22:21:48.410" v="1472" actId="47"/>
+        <pc:sldMkLst>
+          <pc:docMk/>
+          <pc:sldMk cId="788338294" sldId="499"/>
+        </pc:sldMkLst>
+      </pc:sldChg>
+      <pc:sldChg chg="del">
         <pc:chgData name="Yi, Karen" userId="810c5928-e019-4621-9085-23289459b576" providerId="ADAL" clId="{88817176-AB74-4534-BCC2-357A353134DD}" dt="2024-02-20T17:21:35.077" v="1" actId="47"/>
         <pc:sldMkLst>
           <pc:docMk/>
@@ -567,6 +621,13 @@
         <pc:sldMkLst>
           <pc:docMk/>
           <pc:sldMk cId="1245291829" sldId="510"/>
+        </pc:sldMkLst>
+      </pc:sldChg>
+      <pc:sldChg chg="add del">
+        <pc:chgData name="Yi, Karen" userId="810c5928-e019-4621-9085-23289459b576" providerId="ADAL" clId="{88817176-AB74-4534-BCC2-357A353134DD}" dt="2024-02-28T22:21:41.697" v="1471" actId="47"/>
+        <pc:sldMkLst>
+          <pc:docMk/>
+          <pc:sldMk cId="1687533577" sldId="512"/>
         </pc:sldMkLst>
       </pc:sldChg>
       <pc:sldChg chg="del">
@@ -630,8 +691,15 @@
           </ac:spMkLst>
         </pc:spChg>
       </pc:sldChg>
-      <pc:sldChg chg="delSp modSp add mod">
-        <pc:chgData name="Yi, Karen" userId="810c5928-e019-4621-9085-23289459b576" providerId="ADAL" clId="{88817176-AB74-4534-BCC2-357A353134DD}" dt="2024-02-27T18:12:35.216" v="1093" actId="478"/>
+      <pc:sldChg chg="del">
+        <pc:chgData name="Yi, Karen" userId="810c5928-e019-4621-9085-23289459b576" providerId="ADAL" clId="{88817176-AB74-4534-BCC2-357A353134DD}" dt="2024-02-28T22:21:53.116" v="1473" actId="47"/>
+        <pc:sldMkLst>
+          <pc:docMk/>
+          <pc:sldMk cId="862728739" sldId="519"/>
+        </pc:sldMkLst>
+      </pc:sldChg>
+      <pc:sldChg chg="addSp delSp modSp add mod">
+        <pc:chgData name="Yi, Karen" userId="810c5928-e019-4621-9085-23289459b576" providerId="ADAL" clId="{88817176-AB74-4534-BCC2-357A353134DD}" dt="2024-02-28T23:21:27.123" v="1999" actId="20577"/>
         <pc:sldMkLst>
           <pc:docMk/>
           <pc:sldMk cId="806759588" sldId="520"/>
@@ -645,7 +713,7 @@
           </ac:spMkLst>
         </pc:spChg>
         <pc:spChg chg="mod">
-          <ac:chgData name="Yi, Karen" userId="810c5928-e019-4621-9085-23289459b576" providerId="ADAL" clId="{88817176-AB74-4534-BCC2-357A353134DD}" dt="2024-02-27T18:12:31.122" v="1091" actId="20577"/>
+          <ac:chgData name="Yi, Karen" userId="810c5928-e019-4621-9085-23289459b576" providerId="ADAL" clId="{88817176-AB74-4534-BCC2-357A353134DD}" dt="2024-02-28T23:21:27.123" v="1999" actId="20577"/>
           <ac:spMkLst>
             <pc:docMk/>
             <pc:sldMk cId="806759588" sldId="520"/>
@@ -660,9 +728,25 @@
             <ac:graphicFrameMk id="6" creationId="{E8CDB5EA-4D44-3620-652E-2922E87A74CD}"/>
           </ac:graphicFrameMkLst>
         </pc:graphicFrameChg>
+        <pc:picChg chg="add mod">
+          <ac:chgData name="Yi, Karen" userId="810c5928-e019-4621-9085-23289459b576" providerId="ADAL" clId="{88817176-AB74-4534-BCC2-357A353134DD}" dt="2024-02-28T23:16:52.950" v="1709" actId="14100"/>
+          <ac:picMkLst>
+            <pc:docMk/>
+            <pc:sldMk cId="806759588" sldId="520"/>
+            <ac:picMk id="4" creationId="{7A9A1A18-431E-CAFD-B5B2-21731455449F}"/>
+          </ac:picMkLst>
+        </pc:picChg>
+        <pc:picChg chg="add mod">
+          <ac:chgData name="Yi, Karen" userId="810c5928-e019-4621-9085-23289459b576" providerId="ADAL" clId="{88817176-AB74-4534-BCC2-357A353134DD}" dt="2024-02-28T23:16:55.554" v="1710" actId="14100"/>
+          <ac:picMkLst>
+            <pc:docMk/>
+            <pc:sldMk cId="806759588" sldId="520"/>
+            <ac:picMk id="7" creationId="{3B37647E-6C4F-AE7D-A063-41AC6257DC2E}"/>
+          </ac:picMkLst>
+        </pc:picChg>
       </pc:sldChg>
-      <pc:sldChg chg="modSp add mod">
-        <pc:chgData name="Yi, Karen" userId="810c5928-e019-4621-9085-23289459b576" providerId="ADAL" clId="{88817176-AB74-4534-BCC2-357A353134DD}" dt="2024-02-27T18:14:05.392" v="1251" actId="20577"/>
+      <pc:sldChg chg="addSp delSp modSp add mod">
+        <pc:chgData name="Yi, Karen" userId="810c5928-e019-4621-9085-23289459b576" providerId="ADAL" clId="{88817176-AB74-4534-BCC2-357A353134DD}" dt="2024-02-28T23:14:38.312" v="1703" actId="20577"/>
         <pc:sldMkLst>
           <pc:docMk/>
           <pc:sldMk cId="2530566933" sldId="521"/>
@@ -676,20 +760,75 @@
           </ac:spMkLst>
         </pc:spChg>
         <pc:spChg chg="mod">
-          <ac:chgData name="Yi, Karen" userId="810c5928-e019-4621-9085-23289459b576" providerId="ADAL" clId="{88817176-AB74-4534-BCC2-357A353134DD}" dt="2024-02-27T18:14:05.392" v="1251" actId="20577"/>
+          <ac:chgData name="Yi, Karen" userId="810c5928-e019-4621-9085-23289459b576" providerId="ADAL" clId="{88817176-AB74-4534-BCC2-357A353134DD}" dt="2024-02-28T23:14:38.312" v="1703" actId="20577"/>
           <ac:spMkLst>
             <pc:docMk/>
             <pc:sldMk cId="2530566933" sldId="521"/>
             <ac:spMk id="18" creationId="{7E3D13BF-BE43-473C-AD59-4E81D3898A5B}"/>
           </ac:spMkLst>
         </pc:spChg>
+        <pc:picChg chg="add del mod">
+          <ac:chgData name="Yi, Karen" userId="810c5928-e019-4621-9085-23289459b576" providerId="ADAL" clId="{88817176-AB74-4534-BCC2-357A353134DD}" dt="2024-02-28T23:14:22.227" v="1685" actId="478"/>
+          <ac:picMkLst>
+            <pc:docMk/>
+            <pc:sldMk cId="2530566933" sldId="521"/>
+            <ac:picMk id="4" creationId="{457F5DB5-F524-D73A-3F2B-F5002BCD4DD4}"/>
+          </ac:picMkLst>
+        </pc:picChg>
+        <pc:picChg chg="add mod">
+          <ac:chgData name="Yi, Karen" userId="810c5928-e019-4621-9085-23289459b576" providerId="ADAL" clId="{88817176-AB74-4534-BCC2-357A353134DD}" dt="2024-02-28T23:14:23.951" v="1687" actId="1076"/>
+          <ac:picMkLst>
+            <pc:docMk/>
+            <pc:sldMk cId="2530566933" sldId="521"/>
+            <ac:picMk id="7" creationId="{7CEA4FA5-F2E5-9456-D678-FFA3AA17C067}"/>
+          </ac:picMkLst>
+        </pc:picChg>
       </pc:sldChg>
-      <pc:sldChg chg="add">
-        <pc:chgData name="Yi, Karen" userId="810c5928-e019-4621-9085-23289459b576" providerId="ADAL" clId="{88817176-AB74-4534-BCC2-357A353134DD}" dt="2024-02-27T18:13:21.853" v="1113"/>
+      <pc:sldChg chg="modSp add mod modNotesTx">
+        <pc:chgData name="Yi, Karen" userId="810c5928-e019-4621-9085-23289459b576" providerId="ADAL" clId="{88817176-AB74-4534-BCC2-357A353134DD}" dt="2024-02-28T23:27:20.024" v="2387" actId="20577"/>
         <pc:sldMkLst>
           <pc:docMk/>
           <pc:sldMk cId="3733444027" sldId="522"/>
         </pc:sldMkLst>
+        <pc:graphicFrameChg chg="mod">
+          <ac:chgData name="Yi, Karen" userId="810c5928-e019-4621-9085-23289459b576" providerId="ADAL" clId="{88817176-AB74-4534-BCC2-357A353134DD}" dt="2024-02-28T23:20:22.213" v="1737" actId="1076"/>
+          <ac:graphicFrameMkLst>
+            <pc:docMk/>
+            <pc:sldMk cId="3733444027" sldId="522"/>
+            <ac:graphicFrameMk id="6" creationId="{E8CDB5EA-4D44-3620-652E-2922E87A74CD}"/>
+          </ac:graphicFrameMkLst>
+        </pc:graphicFrameChg>
+      </pc:sldChg>
+      <pc:sldChg chg="addSp modSp add mod modNotesTx">
+        <pc:chgData name="Yi, Karen" userId="810c5928-e019-4621-9085-23289459b576" providerId="ADAL" clId="{88817176-AB74-4534-BCC2-357A353134DD}" dt="2024-02-28T23:26:59.350" v="2361" actId="20577"/>
+        <pc:sldMkLst>
+          <pc:docMk/>
+          <pc:sldMk cId="3023023630" sldId="523"/>
+        </pc:sldMkLst>
+        <pc:spChg chg="mod">
+          <ac:chgData name="Yi, Karen" userId="810c5928-e019-4621-9085-23289459b576" providerId="ADAL" clId="{88817176-AB74-4534-BCC2-357A353134DD}" dt="2024-02-28T23:21:42.199" v="2017" actId="20577"/>
+          <ac:spMkLst>
+            <pc:docMk/>
+            <pc:sldMk cId="3023023630" sldId="523"/>
+            <ac:spMk id="5" creationId="{00000000-0000-0000-0000-000000000000}"/>
+          </ac:spMkLst>
+        </pc:spChg>
+        <pc:spChg chg="mod">
+          <ac:chgData name="Yi, Karen" userId="810c5928-e019-4621-9085-23289459b576" providerId="ADAL" clId="{88817176-AB74-4534-BCC2-357A353134DD}" dt="2024-02-28T23:26:21.758" v="2222" actId="20577"/>
+          <ac:spMkLst>
+            <pc:docMk/>
+            <pc:sldMk cId="3023023630" sldId="523"/>
+            <ac:spMk id="9" creationId="{00000000-0000-0000-0000-000000000000}"/>
+          </ac:spMkLst>
+        </pc:spChg>
+        <pc:picChg chg="add mod">
+          <ac:chgData name="Yi, Karen" userId="810c5928-e019-4621-9085-23289459b576" providerId="ADAL" clId="{88817176-AB74-4534-BCC2-357A353134DD}" dt="2024-02-28T23:26:25.530" v="2223" actId="1076"/>
+          <ac:picMkLst>
+            <pc:docMk/>
+            <pc:sldMk cId="3023023630" sldId="523"/>
+            <ac:picMk id="4" creationId="{765A9ACD-8B69-55CB-AC7E-60DD9A84BA6C}"/>
+          </ac:picMkLst>
+        </pc:picChg>
       </pc:sldChg>
       <pc:sldChg chg="del">
         <pc:chgData name="Yi, Karen" userId="810c5928-e019-4621-9085-23289459b576" providerId="ADAL" clId="{88817176-AB74-4534-BCC2-357A353134DD}" dt="2024-02-20T17:21:35.077" v="1" actId="47"/>
@@ -697,6 +836,37 @@
           <pc:docMk/>
           <pc:sldMk cId="3871957991" sldId="524"/>
         </pc:sldMkLst>
+      </pc:sldChg>
+      <pc:sldChg chg="addSp modSp add mod">
+        <pc:chgData name="Yi, Karen" userId="810c5928-e019-4621-9085-23289459b576" providerId="ADAL" clId="{88817176-AB74-4534-BCC2-357A353134DD}" dt="2024-02-28T23:23:59.122" v="2202" actId="1076"/>
+        <pc:sldMkLst>
+          <pc:docMk/>
+          <pc:sldMk cId="4040656998" sldId="524"/>
+        </pc:sldMkLst>
+        <pc:spChg chg="mod">
+          <ac:chgData name="Yi, Karen" userId="810c5928-e019-4621-9085-23289459b576" providerId="ADAL" clId="{88817176-AB74-4534-BCC2-357A353134DD}" dt="2024-02-28T22:23:16.959" v="1609"/>
+          <ac:spMkLst>
+            <pc:docMk/>
+            <pc:sldMk cId="4040656998" sldId="524"/>
+            <ac:spMk id="5" creationId="{00000000-0000-0000-0000-000000000000}"/>
+          </ac:spMkLst>
+        </pc:spChg>
+        <pc:spChg chg="mod">
+          <ac:chgData name="Yi, Karen" userId="810c5928-e019-4621-9085-23289459b576" providerId="ADAL" clId="{88817176-AB74-4534-BCC2-357A353134DD}" dt="2024-02-28T23:23:43.963" v="2196" actId="14100"/>
+          <ac:spMkLst>
+            <pc:docMk/>
+            <pc:sldMk cId="4040656998" sldId="524"/>
+            <ac:spMk id="9" creationId="{00000000-0000-0000-0000-000000000000}"/>
+          </ac:spMkLst>
+        </pc:spChg>
+        <pc:picChg chg="add mod">
+          <ac:chgData name="Yi, Karen" userId="810c5928-e019-4621-9085-23289459b576" providerId="ADAL" clId="{88817176-AB74-4534-BCC2-357A353134DD}" dt="2024-02-28T23:23:59.122" v="2202" actId="1076"/>
+          <ac:picMkLst>
+            <pc:docMk/>
+            <pc:sldMk cId="4040656998" sldId="524"/>
+            <ac:picMk id="4" creationId="{E0D44335-0616-A139-F7B8-B63A7093444C}"/>
+          </ac:picMkLst>
+        </pc:picChg>
       </pc:sldChg>
       <pc:sldChg chg="del">
         <pc:chgData name="Yi, Karen" userId="810c5928-e019-4621-9085-23289459b576" providerId="ADAL" clId="{88817176-AB74-4534-BCC2-357A353134DD}" dt="2024-02-20T17:21:35.077" v="1" actId="47"/>
@@ -732,1012 +902,6 @@
 </pc:chgInfo>
 </file>
 
-<file path=ppt/charts/chart1.xml><?xml version="1.0" encoding="utf-8"?>
-<c:chartSpace xmlns:c="http://schemas.openxmlformats.org/drawingml/2006/chart" xmlns:a="http://schemas.openxmlformats.org/drawingml/2006/main" xmlns:r="http://schemas.openxmlformats.org/officeDocument/2006/relationships" xmlns:c16r2="http://schemas.microsoft.com/office/drawing/2015/06/chart">
-  <c:date1904 val="0"/>
-  <c:lang val="en-US"/>
-  <c:roundedCorners val="0"/>
-  <mc:AlternateContent xmlns:mc="http://schemas.openxmlformats.org/markup-compatibility/2006">
-    <mc:Choice xmlns:c14="http://schemas.microsoft.com/office/drawing/2007/8/2/chart" Requires="c14">
-      <c14:style val="102"/>
-    </mc:Choice>
-    <mc:Fallback>
-      <c:style val="2"/>
-    </mc:Fallback>
-  </mc:AlternateContent>
-  <c:chart>
-    <c:title>
-      <c:overlay val="0"/>
-      <c:spPr>
-        <a:noFill/>
-        <a:ln>
-          <a:noFill/>
-        </a:ln>
-        <a:effectLst/>
-      </c:spPr>
-      <c:txPr>
-        <a:bodyPr rot="0" spcFirstLastPara="1" vertOverflow="ellipsis" vert="horz" wrap="square" anchor="ctr" anchorCtr="1"/>
-        <a:lstStyle/>
-        <a:p>
-          <a:pPr>
-            <a:defRPr sz="1680" b="0" i="0" u="none" strike="noStrike" kern="1200" spc="0" baseline="0">
-              <a:solidFill>
-                <a:schemeClr val="tx1">
-                  <a:lumMod val="65000"/>
-                  <a:lumOff val="35000"/>
-                </a:schemeClr>
-              </a:solidFill>
-              <a:latin typeface="+mn-lt"/>
-              <a:ea typeface="+mn-ea"/>
-              <a:cs typeface="+mn-cs"/>
-            </a:defRPr>
-          </a:pPr>
-          <a:endParaRPr lang="en-US"/>
-        </a:p>
-      </c:txPr>
-    </c:title>
-    <c:autoTitleDeleted val="0"/>
-    <c:plotArea>
-      <c:layout/>
-      <c:barChart>
-        <c:barDir val="col"/>
-        <c:grouping val="clustered"/>
-        <c:varyColors val="0"/>
-        <c:ser>
-          <c:idx val="0"/>
-          <c:order val="0"/>
-          <c:tx>
-            <c:strRef>
-              <c:f>Sheet1!$B$1</c:f>
-              <c:strCache>
-                <c:ptCount val="1"/>
-                <c:pt idx="0">
-                  <c:v>Series 1</c:v>
-                </c:pt>
-              </c:strCache>
-            </c:strRef>
-          </c:tx>
-          <c:spPr>
-            <a:solidFill>
-              <a:schemeClr val="accent1"/>
-            </a:solidFill>
-            <a:ln>
-              <a:solidFill>
-                <a:schemeClr val="tx1"/>
-              </a:solidFill>
-            </a:ln>
-            <a:effectLst/>
-          </c:spPr>
-          <c:invertIfNegative val="0"/>
-          <c:cat>
-            <c:strRef>
-              <c:f>Sheet1!$A$2:$A$5</c:f>
-              <c:strCache>
-                <c:ptCount val="4"/>
-                <c:pt idx="0">
-                  <c:v>Category 1</c:v>
-                </c:pt>
-                <c:pt idx="1">
-                  <c:v>Category 2</c:v>
-                </c:pt>
-                <c:pt idx="2">
-                  <c:v>Category 3</c:v>
-                </c:pt>
-                <c:pt idx="3">
-                  <c:v>Category 4</c:v>
-                </c:pt>
-              </c:strCache>
-            </c:strRef>
-          </c:cat>
-          <c:val>
-            <c:numRef>
-              <c:f>Sheet1!$B$2:$B$5</c:f>
-              <c:numCache>
-                <c:formatCode>General</c:formatCode>
-                <c:ptCount val="4"/>
-                <c:pt idx="0">
-                  <c:v>4.3</c:v>
-                </c:pt>
-                <c:pt idx="1">
-                  <c:v>2.5</c:v>
-                </c:pt>
-                <c:pt idx="2">
-                  <c:v>3.5</c:v>
-                </c:pt>
-                <c:pt idx="3">
-                  <c:v>4.5</c:v>
-                </c:pt>
-              </c:numCache>
-            </c:numRef>
-          </c:val>
-          <c:extLst>
-            <c:ext xmlns:c16="http://schemas.microsoft.com/office/drawing/2014/chart" uri="{C3380CC4-5D6E-409C-BE32-E72D297353CC}">
-              <c16:uniqueId val="{00000000-1BDF-BC41-A124-DC4D2DC2F89C}"/>
-            </c:ext>
-          </c:extLst>
-        </c:ser>
-        <c:ser>
-          <c:idx val="1"/>
-          <c:order val="1"/>
-          <c:tx>
-            <c:strRef>
-              <c:f>Sheet1!$C$1</c:f>
-              <c:strCache>
-                <c:ptCount val="1"/>
-                <c:pt idx="0">
-                  <c:v>Series 2</c:v>
-                </c:pt>
-              </c:strCache>
-            </c:strRef>
-          </c:tx>
-          <c:spPr>
-            <a:solidFill>
-              <a:schemeClr val="accent2"/>
-            </a:solidFill>
-            <a:ln>
-              <a:solidFill>
-                <a:schemeClr val="tx1"/>
-              </a:solidFill>
-            </a:ln>
-            <a:effectLst/>
-          </c:spPr>
-          <c:invertIfNegative val="0"/>
-          <c:cat>
-            <c:strRef>
-              <c:f>Sheet1!$A$2:$A$5</c:f>
-              <c:strCache>
-                <c:ptCount val="4"/>
-                <c:pt idx="0">
-                  <c:v>Category 1</c:v>
-                </c:pt>
-                <c:pt idx="1">
-                  <c:v>Category 2</c:v>
-                </c:pt>
-                <c:pt idx="2">
-                  <c:v>Category 3</c:v>
-                </c:pt>
-                <c:pt idx="3">
-                  <c:v>Category 4</c:v>
-                </c:pt>
-              </c:strCache>
-            </c:strRef>
-          </c:cat>
-          <c:val>
-            <c:numRef>
-              <c:f>Sheet1!$C$2:$C$5</c:f>
-              <c:numCache>
-                <c:formatCode>General</c:formatCode>
-                <c:ptCount val="4"/>
-                <c:pt idx="0">
-                  <c:v>2.4</c:v>
-                </c:pt>
-                <c:pt idx="1">
-                  <c:v>4.4000000000000004</c:v>
-                </c:pt>
-                <c:pt idx="2">
-                  <c:v>1.8</c:v>
-                </c:pt>
-                <c:pt idx="3">
-                  <c:v>2.8</c:v>
-                </c:pt>
-              </c:numCache>
-            </c:numRef>
-          </c:val>
-          <c:extLst>
-            <c:ext xmlns:c16="http://schemas.microsoft.com/office/drawing/2014/chart" uri="{C3380CC4-5D6E-409C-BE32-E72D297353CC}">
-              <c16:uniqueId val="{00000001-1BDF-BC41-A124-DC4D2DC2F89C}"/>
-            </c:ext>
-          </c:extLst>
-        </c:ser>
-        <c:ser>
-          <c:idx val="2"/>
-          <c:order val="2"/>
-          <c:tx>
-            <c:strRef>
-              <c:f>Sheet1!$D$1</c:f>
-              <c:strCache>
-                <c:ptCount val="1"/>
-                <c:pt idx="0">
-                  <c:v>Series 3</c:v>
-                </c:pt>
-              </c:strCache>
-            </c:strRef>
-          </c:tx>
-          <c:spPr>
-            <a:solidFill>
-              <a:schemeClr val="accent4"/>
-            </a:solidFill>
-            <a:ln>
-              <a:solidFill>
-                <a:schemeClr val="tx1"/>
-              </a:solidFill>
-            </a:ln>
-            <a:effectLst/>
-          </c:spPr>
-          <c:invertIfNegative val="0"/>
-          <c:cat>
-            <c:strRef>
-              <c:f>Sheet1!$A$2:$A$5</c:f>
-              <c:strCache>
-                <c:ptCount val="4"/>
-                <c:pt idx="0">
-                  <c:v>Category 1</c:v>
-                </c:pt>
-                <c:pt idx="1">
-                  <c:v>Category 2</c:v>
-                </c:pt>
-                <c:pt idx="2">
-                  <c:v>Category 3</c:v>
-                </c:pt>
-                <c:pt idx="3">
-                  <c:v>Category 4</c:v>
-                </c:pt>
-              </c:strCache>
-            </c:strRef>
-          </c:cat>
-          <c:val>
-            <c:numRef>
-              <c:f>Sheet1!$D$2:$D$5</c:f>
-              <c:numCache>
-                <c:formatCode>General</c:formatCode>
-                <c:ptCount val="4"/>
-                <c:pt idx="0">
-                  <c:v>2</c:v>
-                </c:pt>
-                <c:pt idx="1">
-                  <c:v>2</c:v>
-                </c:pt>
-                <c:pt idx="2">
-                  <c:v>3</c:v>
-                </c:pt>
-                <c:pt idx="3">
-                  <c:v>5</c:v>
-                </c:pt>
-              </c:numCache>
-            </c:numRef>
-          </c:val>
-          <c:extLst>
-            <c:ext xmlns:c16="http://schemas.microsoft.com/office/drawing/2014/chart" uri="{C3380CC4-5D6E-409C-BE32-E72D297353CC}">
-              <c16:uniqueId val="{00000002-1BDF-BC41-A124-DC4D2DC2F89C}"/>
-            </c:ext>
-          </c:extLst>
-        </c:ser>
-        <c:dLbls>
-          <c:showLegendKey val="0"/>
-          <c:showVal val="0"/>
-          <c:showCatName val="0"/>
-          <c:showSerName val="0"/>
-          <c:showPercent val="0"/>
-          <c:showBubbleSize val="0"/>
-        </c:dLbls>
-        <c:gapWidth val="219"/>
-        <c:overlap val="-27"/>
-        <c:axId val="684174592"/>
-        <c:axId val="684176240"/>
-      </c:barChart>
-      <c:catAx>
-        <c:axId val="684174592"/>
-        <c:scaling>
-          <c:orientation val="minMax"/>
-        </c:scaling>
-        <c:delete val="0"/>
-        <c:axPos val="b"/>
-        <c:numFmt formatCode="General" sourceLinked="1"/>
-        <c:majorTickMark val="none"/>
-        <c:minorTickMark val="none"/>
-        <c:tickLblPos val="nextTo"/>
-        <c:spPr>
-          <a:noFill/>
-          <a:ln w="9525" cap="flat" cmpd="sng" algn="ctr">
-            <a:solidFill>
-              <a:schemeClr val="tx1">
-                <a:lumMod val="15000"/>
-                <a:lumOff val="85000"/>
-              </a:schemeClr>
-            </a:solidFill>
-            <a:round/>
-          </a:ln>
-          <a:effectLst/>
-        </c:spPr>
-        <c:txPr>
-          <a:bodyPr rot="-60000000" spcFirstLastPara="1" vertOverflow="ellipsis" vert="horz" wrap="square" anchor="ctr" anchorCtr="1"/>
-          <a:lstStyle/>
-          <a:p>
-            <a:pPr>
-              <a:defRPr sz="1400" b="0" i="0" u="none" strike="noStrike" kern="1200" baseline="0">
-                <a:solidFill>
-                  <a:schemeClr val="tx1">
-                    <a:lumMod val="65000"/>
-                    <a:lumOff val="35000"/>
-                  </a:schemeClr>
-                </a:solidFill>
-                <a:latin typeface="+mn-lt"/>
-                <a:ea typeface="+mn-ea"/>
-                <a:cs typeface="+mn-cs"/>
-              </a:defRPr>
-            </a:pPr>
-            <a:endParaRPr lang="en-US"/>
-          </a:p>
-        </c:txPr>
-        <c:crossAx val="684176240"/>
-        <c:crosses val="autoZero"/>
-        <c:auto val="1"/>
-        <c:lblAlgn val="ctr"/>
-        <c:lblOffset val="100"/>
-        <c:noMultiLvlLbl val="0"/>
-      </c:catAx>
-      <c:valAx>
-        <c:axId val="684176240"/>
-        <c:scaling>
-          <c:orientation val="minMax"/>
-        </c:scaling>
-        <c:delete val="0"/>
-        <c:axPos val="l"/>
-        <c:majorGridlines>
-          <c:spPr>
-            <a:ln w="9525" cap="flat" cmpd="sng" algn="ctr">
-              <a:solidFill>
-                <a:schemeClr val="tx1">
-                  <a:lumMod val="15000"/>
-                  <a:lumOff val="85000"/>
-                </a:schemeClr>
-              </a:solidFill>
-              <a:round/>
-            </a:ln>
-            <a:effectLst/>
-          </c:spPr>
-        </c:majorGridlines>
-        <c:numFmt formatCode="General" sourceLinked="1"/>
-        <c:majorTickMark val="none"/>
-        <c:minorTickMark val="none"/>
-        <c:tickLblPos val="nextTo"/>
-        <c:spPr>
-          <a:noFill/>
-          <a:ln>
-            <a:noFill/>
-          </a:ln>
-          <a:effectLst/>
-        </c:spPr>
-        <c:txPr>
-          <a:bodyPr rot="-60000000" spcFirstLastPara="1" vertOverflow="ellipsis" vert="horz" wrap="square" anchor="ctr" anchorCtr="1"/>
-          <a:lstStyle/>
-          <a:p>
-            <a:pPr>
-              <a:defRPr sz="1400" b="0" i="0" u="none" strike="noStrike" kern="1200" baseline="0">
-                <a:solidFill>
-                  <a:schemeClr val="tx1">
-                    <a:lumMod val="65000"/>
-                    <a:lumOff val="35000"/>
-                  </a:schemeClr>
-                </a:solidFill>
-                <a:latin typeface="+mn-lt"/>
-                <a:ea typeface="+mn-ea"/>
-                <a:cs typeface="+mn-cs"/>
-              </a:defRPr>
-            </a:pPr>
-            <a:endParaRPr lang="en-US"/>
-          </a:p>
-        </c:txPr>
-        <c:crossAx val="684174592"/>
-        <c:crosses val="autoZero"/>
-        <c:crossBetween val="between"/>
-      </c:valAx>
-      <c:spPr>
-        <a:noFill/>
-        <a:ln>
-          <a:noFill/>
-        </a:ln>
-        <a:effectLst/>
-      </c:spPr>
-    </c:plotArea>
-    <c:legend>
-      <c:legendPos val="b"/>
-      <c:overlay val="0"/>
-      <c:spPr>
-        <a:noFill/>
-        <a:ln>
-          <a:noFill/>
-        </a:ln>
-        <a:effectLst/>
-      </c:spPr>
-      <c:txPr>
-        <a:bodyPr rot="0" spcFirstLastPara="1" vertOverflow="ellipsis" vert="horz" wrap="square" anchor="ctr" anchorCtr="1"/>
-        <a:lstStyle/>
-        <a:p>
-          <a:pPr>
-            <a:defRPr sz="1400" b="0" i="0" u="none" strike="noStrike" kern="1200" baseline="0">
-              <a:solidFill>
-                <a:schemeClr val="tx1">
-                  <a:lumMod val="65000"/>
-                  <a:lumOff val="35000"/>
-                </a:schemeClr>
-              </a:solidFill>
-              <a:latin typeface="+mn-lt"/>
-              <a:ea typeface="+mn-ea"/>
-              <a:cs typeface="+mn-cs"/>
-            </a:defRPr>
-          </a:pPr>
-          <a:endParaRPr lang="en-US"/>
-        </a:p>
-      </c:txPr>
-    </c:legend>
-    <c:plotVisOnly val="1"/>
-    <c:dispBlanksAs val="gap"/>
-    <c:extLst>
-      <c:ext xmlns:c16r3="http://schemas.microsoft.com/office/drawing/2017/03/chart" uri="{56B9EC1D-385E-4148-901F-78D8002777C0}">
-        <c16r3:dataDisplayOptions16>
-          <c16r3:dispNaAsBlank val="1"/>
-        </c16r3:dataDisplayOptions16>
-      </c:ext>
-    </c:extLst>
-    <c:showDLblsOverMax val="0"/>
-  </c:chart>
-  <c:spPr>
-    <a:noFill/>
-    <a:ln>
-      <a:noFill/>
-    </a:ln>
-    <a:effectLst/>
-  </c:spPr>
-  <c:txPr>
-    <a:bodyPr/>
-    <a:lstStyle/>
-    <a:p>
-      <a:pPr>
-        <a:defRPr sz="1400"/>
-      </a:pPr>
-      <a:endParaRPr lang="en-US"/>
-    </a:p>
-  </c:txPr>
-  <c:externalData r:id="rId3">
-    <c:autoUpdate val="0"/>
-  </c:externalData>
-</c:chartSpace>
-</file>
-
-<file path=ppt/charts/colors1.xml><?xml version="1.0" encoding="utf-8"?>
-<cs:colorStyle xmlns:cs="http://schemas.microsoft.com/office/drawing/2012/chartStyle" xmlns:a="http://schemas.openxmlformats.org/drawingml/2006/main" meth="cycle" id="10">
-  <a:schemeClr val="accent1"/>
-  <a:schemeClr val="accent2"/>
-  <a:schemeClr val="accent3"/>
-  <a:schemeClr val="accent4"/>
-  <a:schemeClr val="accent5"/>
-  <a:schemeClr val="accent6"/>
-  <cs:variation/>
-  <cs:variation>
-    <a:lumMod val="60000"/>
-  </cs:variation>
-  <cs:variation>
-    <a:lumMod val="80000"/>
-    <a:lumOff val="20000"/>
-  </cs:variation>
-  <cs:variation>
-    <a:lumMod val="80000"/>
-  </cs:variation>
-  <cs:variation>
-    <a:lumMod val="60000"/>
-    <a:lumOff val="40000"/>
-  </cs:variation>
-  <cs:variation>
-    <a:lumMod val="50000"/>
-  </cs:variation>
-  <cs:variation>
-    <a:lumMod val="70000"/>
-    <a:lumOff val="30000"/>
-  </cs:variation>
-  <cs:variation>
-    <a:lumMod val="70000"/>
-  </cs:variation>
-  <cs:variation>
-    <a:lumMod val="50000"/>
-    <a:lumOff val="50000"/>
-  </cs:variation>
-</cs:colorStyle>
-</file>
-
-<file path=ppt/charts/style1.xml><?xml version="1.0" encoding="utf-8"?>
-<cs:chartStyle xmlns:cs="http://schemas.microsoft.com/office/drawing/2012/chartStyle" xmlns:a="http://schemas.openxmlformats.org/drawingml/2006/main" id="201">
-  <cs:axisTitle>
-    <cs:lnRef idx="0"/>
-    <cs:fillRef idx="0"/>
-    <cs:effectRef idx="0"/>
-    <cs:fontRef idx="minor">
-      <a:schemeClr val="tx1">
-        <a:lumMod val="65000"/>
-        <a:lumOff val="35000"/>
-      </a:schemeClr>
-    </cs:fontRef>
-    <cs:defRPr sz="1330" kern="1200"/>
-  </cs:axisTitle>
-  <cs:categoryAxis>
-    <cs:lnRef idx="0"/>
-    <cs:fillRef idx="0"/>
-    <cs:effectRef idx="0"/>
-    <cs:fontRef idx="minor">
-      <a:schemeClr val="tx1">
-        <a:lumMod val="65000"/>
-        <a:lumOff val="35000"/>
-      </a:schemeClr>
-    </cs:fontRef>
-    <cs:spPr>
-      <a:ln w="9525" cap="flat" cmpd="sng" algn="ctr">
-        <a:solidFill>
-          <a:schemeClr val="tx1">
-            <a:lumMod val="15000"/>
-            <a:lumOff val="85000"/>
-          </a:schemeClr>
-        </a:solidFill>
-        <a:round/>
-      </a:ln>
-    </cs:spPr>
-    <cs:defRPr sz="1197" kern="1200"/>
-  </cs:categoryAxis>
-  <cs:chartArea mods="allowNoFillOverride allowNoLineOverride">
-    <cs:lnRef idx="0"/>
-    <cs:fillRef idx="0"/>
-    <cs:effectRef idx="0"/>
-    <cs:fontRef idx="minor">
-      <a:schemeClr val="tx1"/>
-    </cs:fontRef>
-    <cs:spPr>
-      <a:solidFill>
-        <a:schemeClr val="bg1"/>
-      </a:solidFill>
-      <a:ln w="9525" cap="flat" cmpd="sng" algn="ctr">
-        <a:solidFill>
-          <a:schemeClr val="tx1">
-            <a:lumMod val="15000"/>
-            <a:lumOff val="85000"/>
-          </a:schemeClr>
-        </a:solidFill>
-        <a:round/>
-      </a:ln>
-    </cs:spPr>
-    <cs:defRPr sz="1330" kern="1200"/>
-  </cs:chartArea>
-  <cs:dataLabel>
-    <cs:lnRef idx="0"/>
-    <cs:fillRef idx="0"/>
-    <cs:effectRef idx="0"/>
-    <cs:fontRef idx="minor">
-      <a:schemeClr val="tx1">
-        <a:lumMod val="75000"/>
-        <a:lumOff val="25000"/>
-      </a:schemeClr>
-    </cs:fontRef>
-    <cs:defRPr sz="1197" kern="1200"/>
-  </cs:dataLabel>
-  <cs:dataLabelCallout>
-    <cs:lnRef idx="0"/>
-    <cs:fillRef idx="0"/>
-    <cs:effectRef idx="0"/>
-    <cs:fontRef idx="minor">
-      <a:schemeClr val="dk1">
-        <a:lumMod val="65000"/>
-        <a:lumOff val="35000"/>
-      </a:schemeClr>
-    </cs:fontRef>
-    <cs:spPr>
-      <a:solidFill>
-        <a:schemeClr val="lt1"/>
-      </a:solidFill>
-      <a:ln>
-        <a:solidFill>
-          <a:schemeClr val="dk1">
-            <a:lumMod val="25000"/>
-            <a:lumOff val="75000"/>
-          </a:schemeClr>
-        </a:solidFill>
-      </a:ln>
-    </cs:spPr>
-    <cs:defRPr sz="1197" kern="1200"/>
-    <cs:bodyPr rot="0" spcFirstLastPara="1" vertOverflow="clip" horzOverflow="clip" vert="horz" wrap="square" lIns="36576" tIns="18288" rIns="36576" bIns="18288" anchor="ctr" anchorCtr="1">
-      <a:spAutoFit/>
-    </cs:bodyPr>
-  </cs:dataLabelCallout>
-  <cs:dataPoint>
-    <cs:lnRef idx="0"/>
-    <cs:fillRef idx="1">
-      <cs:styleClr val="auto"/>
-    </cs:fillRef>
-    <cs:effectRef idx="0"/>
-    <cs:fontRef idx="minor">
-      <a:schemeClr val="tx1"/>
-    </cs:fontRef>
-  </cs:dataPoint>
-  <cs:dataPoint3D>
-    <cs:lnRef idx="0"/>
-    <cs:fillRef idx="1">
-      <cs:styleClr val="auto"/>
-    </cs:fillRef>
-    <cs:effectRef idx="0"/>
-    <cs:fontRef idx="minor">
-      <a:schemeClr val="tx1"/>
-    </cs:fontRef>
-  </cs:dataPoint3D>
-  <cs:dataPointLine>
-    <cs:lnRef idx="0">
-      <cs:styleClr val="auto"/>
-    </cs:lnRef>
-    <cs:fillRef idx="1"/>
-    <cs:effectRef idx="0"/>
-    <cs:fontRef idx="minor">
-      <a:schemeClr val="tx1"/>
-    </cs:fontRef>
-    <cs:spPr>
-      <a:ln w="28575" cap="rnd">
-        <a:solidFill>
-          <a:schemeClr val="phClr"/>
-        </a:solidFill>
-        <a:round/>
-      </a:ln>
-    </cs:spPr>
-  </cs:dataPointLine>
-  <cs:dataPointMarker>
-    <cs:lnRef idx="0">
-      <cs:styleClr val="auto"/>
-    </cs:lnRef>
-    <cs:fillRef idx="1">
-      <cs:styleClr val="auto"/>
-    </cs:fillRef>
-    <cs:effectRef idx="0"/>
-    <cs:fontRef idx="minor">
-      <a:schemeClr val="tx1"/>
-    </cs:fontRef>
-    <cs:spPr>
-      <a:ln w="9525">
-        <a:solidFill>
-          <a:schemeClr val="phClr"/>
-        </a:solidFill>
-      </a:ln>
-    </cs:spPr>
-  </cs:dataPointMarker>
-  <cs:dataPointMarkerLayout symbol="circle" size="5"/>
-  <cs:dataPointWireframe>
-    <cs:lnRef idx="0">
-      <cs:styleClr val="auto"/>
-    </cs:lnRef>
-    <cs:fillRef idx="1"/>
-    <cs:effectRef idx="0"/>
-    <cs:fontRef idx="minor">
-      <a:schemeClr val="tx1"/>
-    </cs:fontRef>
-    <cs:spPr>
-      <a:ln w="9525" cap="rnd">
-        <a:solidFill>
-          <a:schemeClr val="phClr"/>
-        </a:solidFill>
-        <a:round/>
-      </a:ln>
-    </cs:spPr>
-  </cs:dataPointWireframe>
-  <cs:dataTable>
-    <cs:lnRef idx="0"/>
-    <cs:fillRef idx="0"/>
-    <cs:effectRef idx="0"/>
-    <cs:fontRef idx="minor">
-      <a:schemeClr val="tx1">
-        <a:lumMod val="65000"/>
-        <a:lumOff val="35000"/>
-      </a:schemeClr>
-    </cs:fontRef>
-    <cs:spPr>
-      <a:noFill/>
-      <a:ln w="9525" cap="flat" cmpd="sng" algn="ctr">
-        <a:solidFill>
-          <a:schemeClr val="tx1">
-            <a:lumMod val="15000"/>
-            <a:lumOff val="85000"/>
-          </a:schemeClr>
-        </a:solidFill>
-        <a:round/>
-      </a:ln>
-    </cs:spPr>
-    <cs:defRPr sz="1197" kern="1200"/>
-  </cs:dataTable>
-  <cs:downBar>
-    <cs:lnRef idx="0"/>
-    <cs:fillRef idx="0"/>
-    <cs:effectRef idx="0"/>
-    <cs:fontRef idx="minor">
-      <a:schemeClr val="dk1"/>
-    </cs:fontRef>
-    <cs:spPr>
-      <a:solidFill>
-        <a:schemeClr val="dk1">
-          <a:lumMod val="65000"/>
-          <a:lumOff val="35000"/>
-        </a:schemeClr>
-      </a:solidFill>
-      <a:ln w="9525">
-        <a:solidFill>
-          <a:schemeClr val="tx1">
-            <a:lumMod val="65000"/>
-            <a:lumOff val="35000"/>
-          </a:schemeClr>
-        </a:solidFill>
-      </a:ln>
-    </cs:spPr>
-  </cs:downBar>
-  <cs:dropLine>
-    <cs:lnRef idx="0"/>
-    <cs:fillRef idx="0"/>
-    <cs:effectRef idx="0"/>
-    <cs:fontRef idx="minor">
-      <a:schemeClr val="tx1"/>
-    </cs:fontRef>
-    <cs:spPr>
-      <a:ln w="9525" cap="flat" cmpd="sng" algn="ctr">
-        <a:solidFill>
-          <a:schemeClr val="tx1">
-            <a:lumMod val="35000"/>
-            <a:lumOff val="65000"/>
-          </a:schemeClr>
-        </a:solidFill>
-        <a:round/>
-      </a:ln>
-    </cs:spPr>
-  </cs:dropLine>
-  <cs:errorBar>
-    <cs:lnRef idx="0"/>
-    <cs:fillRef idx="0"/>
-    <cs:effectRef idx="0"/>
-    <cs:fontRef idx="minor">
-      <a:schemeClr val="tx1"/>
-    </cs:fontRef>
-    <cs:spPr>
-      <a:ln w="9525" cap="flat" cmpd="sng" algn="ctr">
-        <a:solidFill>
-          <a:schemeClr val="tx1">
-            <a:lumMod val="65000"/>
-            <a:lumOff val="35000"/>
-          </a:schemeClr>
-        </a:solidFill>
-        <a:round/>
-      </a:ln>
-    </cs:spPr>
-  </cs:errorBar>
-  <cs:floor>
-    <cs:lnRef idx="0"/>
-    <cs:fillRef idx="0"/>
-    <cs:effectRef idx="0"/>
-    <cs:fontRef idx="minor">
-      <a:schemeClr val="tx1"/>
-    </cs:fontRef>
-    <cs:spPr>
-      <a:noFill/>
-      <a:ln>
-        <a:noFill/>
-      </a:ln>
-    </cs:spPr>
-  </cs:floor>
-  <cs:gridlineMajor>
-    <cs:lnRef idx="0"/>
-    <cs:fillRef idx="0"/>
-    <cs:effectRef idx="0"/>
-    <cs:fontRef idx="minor">
-      <a:schemeClr val="tx1"/>
-    </cs:fontRef>
-    <cs:spPr>
-      <a:ln w="9525" cap="flat" cmpd="sng" algn="ctr">
-        <a:solidFill>
-          <a:schemeClr val="tx1">
-            <a:lumMod val="15000"/>
-            <a:lumOff val="85000"/>
-          </a:schemeClr>
-        </a:solidFill>
-        <a:round/>
-      </a:ln>
-    </cs:spPr>
-  </cs:gridlineMajor>
-  <cs:gridlineMinor>
-    <cs:lnRef idx="0"/>
-    <cs:fillRef idx="0"/>
-    <cs:effectRef idx="0"/>
-    <cs:fontRef idx="minor">
-      <a:schemeClr val="tx1"/>
-    </cs:fontRef>
-    <cs:spPr>
-      <a:ln w="9525" cap="flat" cmpd="sng" algn="ctr">
-        <a:solidFill>
-          <a:schemeClr val="tx1">
-            <a:lumMod val="5000"/>
-            <a:lumOff val="95000"/>
-          </a:schemeClr>
-        </a:solidFill>
-        <a:round/>
-      </a:ln>
-    </cs:spPr>
-  </cs:gridlineMinor>
-  <cs:hiLoLine>
-    <cs:lnRef idx="0"/>
-    <cs:fillRef idx="0"/>
-    <cs:effectRef idx="0"/>
-    <cs:fontRef idx="minor">
-      <a:schemeClr val="tx1"/>
-    </cs:fontRef>
-    <cs:spPr>
-      <a:ln w="9525" cap="flat" cmpd="sng" algn="ctr">
-        <a:solidFill>
-          <a:schemeClr val="tx1">
-            <a:lumMod val="75000"/>
-            <a:lumOff val="25000"/>
-          </a:schemeClr>
-        </a:solidFill>
-        <a:round/>
-      </a:ln>
-    </cs:spPr>
-  </cs:hiLoLine>
-  <cs:leaderLine>
-    <cs:lnRef idx="0"/>
-    <cs:fillRef idx="0"/>
-    <cs:effectRef idx="0"/>
-    <cs:fontRef idx="minor">
-      <a:schemeClr val="tx1"/>
-    </cs:fontRef>
-    <cs:spPr>
-      <a:ln w="9525" cap="flat" cmpd="sng" algn="ctr">
-        <a:solidFill>
-          <a:schemeClr val="tx1">
-            <a:lumMod val="35000"/>
-            <a:lumOff val="65000"/>
-          </a:schemeClr>
-        </a:solidFill>
-        <a:round/>
-      </a:ln>
-    </cs:spPr>
-  </cs:leaderLine>
-  <cs:legend>
-    <cs:lnRef idx="0"/>
-    <cs:fillRef idx="0"/>
-    <cs:effectRef idx="0"/>
-    <cs:fontRef idx="minor">
-      <a:schemeClr val="tx1">
-        <a:lumMod val="65000"/>
-        <a:lumOff val="35000"/>
-      </a:schemeClr>
-    </cs:fontRef>
-    <cs:defRPr sz="1197" kern="1200"/>
-  </cs:legend>
-  <cs:plotArea mods="allowNoFillOverride allowNoLineOverride">
-    <cs:lnRef idx="0"/>
-    <cs:fillRef idx="0"/>
-    <cs:effectRef idx="0"/>
-    <cs:fontRef idx="minor">
-      <a:schemeClr val="tx1"/>
-    </cs:fontRef>
-  </cs:plotArea>
-  <cs:plotArea3D mods="allowNoFillOverride allowNoLineOverride">
-    <cs:lnRef idx="0"/>
-    <cs:fillRef idx="0"/>
-    <cs:effectRef idx="0"/>
-    <cs:fontRef idx="minor">
-      <a:schemeClr val="tx1"/>
-    </cs:fontRef>
-  </cs:plotArea3D>
-  <cs:seriesAxis>
-    <cs:lnRef idx="0"/>
-    <cs:fillRef idx="0"/>
-    <cs:effectRef idx="0"/>
-    <cs:fontRef idx="minor">
-      <a:schemeClr val="tx1">
-        <a:lumMod val="65000"/>
-        <a:lumOff val="35000"/>
-      </a:schemeClr>
-    </cs:fontRef>
-    <cs:defRPr sz="1197" kern="1200"/>
-  </cs:seriesAxis>
-  <cs:seriesLine>
-    <cs:lnRef idx="0"/>
-    <cs:fillRef idx="0"/>
-    <cs:effectRef idx="0"/>
-    <cs:fontRef idx="minor">
-      <a:schemeClr val="tx1"/>
-    </cs:fontRef>
-    <cs:spPr>
-      <a:ln w="9525" cap="flat" cmpd="sng" algn="ctr">
-        <a:solidFill>
-          <a:schemeClr val="tx1">
-            <a:lumMod val="35000"/>
-            <a:lumOff val="65000"/>
-          </a:schemeClr>
-        </a:solidFill>
-        <a:round/>
-      </a:ln>
-    </cs:spPr>
-  </cs:seriesLine>
-  <cs:title>
-    <cs:lnRef idx="0"/>
-    <cs:fillRef idx="0"/>
-    <cs:effectRef idx="0"/>
-    <cs:fontRef idx="minor">
-      <a:schemeClr val="tx1">
-        <a:lumMod val="65000"/>
-        <a:lumOff val="35000"/>
-      </a:schemeClr>
-    </cs:fontRef>
-    <cs:defRPr sz="1862" b="0" kern="1200" spc="0" baseline="0"/>
-  </cs:title>
-  <cs:trendline>
-    <cs:lnRef idx="0">
-      <cs:styleClr val="auto"/>
-    </cs:lnRef>
-    <cs:fillRef idx="0"/>
-    <cs:effectRef idx="0"/>
-    <cs:fontRef idx="minor">
-      <a:schemeClr val="tx1"/>
-    </cs:fontRef>
-    <cs:spPr>
-      <a:ln w="19050" cap="rnd">
-        <a:solidFill>
-          <a:schemeClr val="phClr"/>
-        </a:solidFill>
-        <a:prstDash val="sysDot"/>
-      </a:ln>
-    </cs:spPr>
-  </cs:trendline>
-  <cs:trendlineLabel>
-    <cs:lnRef idx="0"/>
-    <cs:fillRef idx="0"/>
-    <cs:effectRef idx="0"/>
-    <cs:fontRef idx="minor">
-      <a:schemeClr val="tx1">
-        <a:lumMod val="65000"/>
-        <a:lumOff val="35000"/>
-      </a:schemeClr>
-    </cs:fontRef>
-    <cs:defRPr sz="1197" kern="1200"/>
-  </cs:trendlineLabel>
-  <cs:upBar>
-    <cs:lnRef idx="0"/>
-    <cs:fillRef idx="0"/>
-    <cs:effectRef idx="0"/>
-    <cs:fontRef idx="minor">
-      <a:schemeClr val="dk1"/>
-    </cs:fontRef>
-    <cs:spPr>
-      <a:solidFill>
-        <a:schemeClr val="lt1"/>
-      </a:solidFill>
-      <a:ln w="9525">
-        <a:solidFill>
-          <a:schemeClr val="tx1">
-            <a:lumMod val="15000"/>
-            <a:lumOff val="85000"/>
-          </a:schemeClr>
-        </a:solidFill>
-      </a:ln>
-    </cs:spPr>
-  </cs:upBar>
-  <cs:valueAxis>
-    <cs:lnRef idx="0"/>
-    <cs:fillRef idx="0"/>
-    <cs:effectRef idx="0"/>
-    <cs:fontRef idx="minor">
-      <a:schemeClr val="tx1">
-        <a:lumMod val="65000"/>
-        <a:lumOff val="35000"/>
-      </a:schemeClr>
-    </cs:fontRef>
-    <cs:defRPr sz="1197" kern="1200"/>
-  </cs:valueAxis>
-  <cs:wall>
-    <cs:lnRef idx="0"/>
-    <cs:fillRef idx="0"/>
-    <cs:effectRef idx="0"/>
-    <cs:fontRef idx="minor">
-      <a:schemeClr val="tx1"/>
-    </cs:fontRef>
-    <cs:spPr>
-      <a:noFill/>
-      <a:ln>
-        <a:noFill/>
-      </a:ln>
-    </cs:spPr>
-  </cs:wall>
-</cs:chartStyle>
-</file>
-
 <file path=ppt/comments/comment1.xml><?xml version="1.0" encoding="utf-8"?>
 <p:cmLst xmlns:a="http://schemas.openxmlformats.org/drawingml/2006/main" xmlns:r="http://schemas.openxmlformats.org/officeDocument/2006/relationships" xmlns:p="http://schemas.openxmlformats.org/presentationml/2006/main">
   <p:cm authorId="4" dt="2021-12-31T01:56:14.574" idx="42">
@@ -1767,21 +931,6 @@
   <p:cm authorId="4" dt="2021-12-31T01:57:26.661" idx="37">
     <p:pos x="40" y="40"/>
     <p:text>AIR generally follows the Publication Manual of the American Psychological Association (APA) 7th edition guidelines for references and citations.</p:text>
-    <p:extLst>
-      <p:ext uri="{C676402C-5697-4E1C-873F-D02D1690AC5C}">
-        <p15:threadingInfo xmlns:p15="http://schemas.microsoft.com/office/powerpoint/2012/main" timeZoneBias="360"/>
-      </p:ext>
-    </p:extLst>
-  </p:cm>
-</p:cmLst>
-</file>
-
-<file path=ppt/comments/comment3.xml><?xml version="1.0" encoding="utf-8"?>
-<p:cmLst xmlns:a="http://schemas.openxmlformats.org/drawingml/2006/main" xmlns:r="http://schemas.openxmlformats.org/officeDocument/2006/relationships" xmlns:p="http://schemas.openxmlformats.org/presentationml/2006/main">
-  <p:cm authorId="4" dt="2021-12-31T01:56:44.914" idx="44">
-    <p:pos x="40" y="40"/>
-    <p:text>Delete AIR internal group name placeholder if not needed.
-CHANGE 20XX to current year and MO/YR to month and year on title and closing slides.</p:text>
     <p:extLst>
       <p:ext uri="{C676402C-5697-4E1C-873F-D02D1690AC5C}">
         <p15:threadingInfo xmlns:p15="http://schemas.microsoft.com/office/powerpoint/2012/main" timeZoneBias="360"/>
@@ -5613,7 +4762,37 @@
       </p:grpSpPr>
       <p:sp>
         <p:nvSpPr>
-          <p:cNvPr id="2" name="Slide Image Placeholder 1"/>
+          <p:cNvPr id="4" name="Slide Number Placeholder 3"/>
+          <p:cNvSpPr>
+            <a:spLocks noGrp="1"/>
+          </p:cNvSpPr>
+          <p:nvPr>
+            <p:ph type="sldNum" sz="quarter" idx="10"/>
+          </p:nvPr>
+        </p:nvSpPr>
+        <p:spPr/>
+        <p:txBody>
+          <a:bodyPr/>
+          <a:lstStyle/>
+          <a:p>
+            <a:fld id="{B54DC83E-89B8-4806-9A94-7D2BAA520DC6}" type="slidenum">
+              <a:rPr lang="en-US" smtClean="0"/>
+              <a:pPr/>
+              <a:t>11</a:t>
+            </a:fld>
+            <a:endParaRPr lang="en-US" dirty="0"/>
+          </a:p>
+        </p:txBody>
+      </p:sp>
+      <p:sp>
+        <p:nvSpPr>
+          <p:cNvPr id="9" name="Slide Image Placeholder 8">
+            <a:extLst>
+              <a:ext uri="{FF2B5EF4-FFF2-40B4-BE49-F238E27FC236}">
+                <a16:creationId xmlns:a16="http://schemas.microsoft.com/office/drawing/2014/main" id="{575F3113-3832-4943-A158-8D65E8EC31DA}"/>
+              </a:ext>
+            </a:extLst>
+          </p:cNvPr>
           <p:cNvSpPr>
             <a:spLocks noGrp="1" noRot="1" noChangeAspect="1"/>
           </p:cNvSpPr>
@@ -5630,7 +4809,13 @@
       </p:sp>
       <p:sp>
         <p:nvSpPr>
-          <p:cNvPr id="3" name="Notes Placeholder 2"/>
+          <p:cNvPr id="10" name="Notes Placeholder 9">
+            <a:extLst>
+              <a:ext uri="{FF2B5EF4-FFF2-40B4-BE49-F238E27FC236}">
+                <a16:creationId xmlns:a16="http://schemas.microsoft.com/office/drawing/2014/main" id="{9C4D8084-0CF4-451C-A8FF-83CAF6A380FD}"/>
+              </a:ext>
+            </a:extLst>
+          </p:cNvPr>
           <p:cNvSpPr>
             <a:spLocks noGrp="1"/>
           </p:cNvSpPr>
@@ -5643,37 +4828,35 @@
           <a:bodyPr/>
           <a:lstStyle/>
           <a:p>
-            <a:endParaRPr lang="en-US" dirty="0"/>
-          </a:p>
-        </p:txBody>
-      </p:sp>
-      <p:sp>
-        <p:nvSpPr>
-          <p:cNvPr id="4" name="Slide Number Placeholder 3"/>
-          <p:cNvSpPr>
-            <a:spLocks noGrp="1"/>
-          </p:cNvSpPr>
-          <p:nvPr>
-            <p:ph type="sldNum" sz="quarter" idx="5"/>
-          </p:nvPr>
-        </p:nvSpPr>
-        <p:spPr/>
-        <p:txBody>
-          <a:bodyPr/>
-          <a:lstStyle/>
-          <a:p>
-            <a:fld id="{62B4F2D4-6104-46A2-B90A-3C360EC68CD7}" type="slidenum">
-              <a:rPr lang="en-US" smtClean="0"/>
-              <a:t>11</a:t>
-            </a:fld>
-            <a:endParaRPr lang="en-US" dirty="0"/>
+            <a:r>
+              <a:rPr lang="en-US" dirty="0"/>
+              <a:t>Host website on </a:t>
+            </a:r>
+            <a:r>
+              <a:rPr lang="en-US" dirty="0" err="1"/>
+              <a:t>Github</a:t>
+            </a:r>
+            <a:r>
+              <a:rPr lang="en-US" dirty="0"/>
+              <a:t> Pages so everyone can view it</a:t>
+            </a:r>
+          </a:p>
+          <a:p>
+            <a:r>
+              <a:rPr lang="en-US" dirty="0" err="1"/>
+              <a:t>Github</a:t>
+            </a:r>
+            <a:r>
+              <a:rPr lang="en-US" dirty="0"/>
+              <a:t> Pages is public to everyone, so you can also output as PDF</a:t>
+            </a:r>
           </a:p>
         </p:txBody>
       </p:sp>
     </p:spTree>
     <p:extLst>
       <p:ext uri="{BB962C8B-B14F-4D97-AF65-F5344CB8AC3E}">
-        <p14:creationId xmlns:p14="http://schemas.microsoft.com/office/powerpoint/2010/main" val="3878492153"/>
+        <p14:creationId xmlns:p14="http://schemas.microsoft.com/office/powerpoint/2010/main" val="1224024439"/>
       </p:ext>
     </p:extLst>
   </p:cSld>
@@ -5702,7 +4885,37 @@
       </p:grpSpPr>
       <p:sp>
         <p:nvSpPr>
-          <p:cNvPr id="2" name="Slide Image Placeholder 1"/>
+          <p:cNvPr id="4" name="Slide Number Placeholder 3"/>
+          <p:cNvSpPr>
+            <a:spLocks noGrp="1"/>
+          </p:cNvSpPr>
+          <p:nvPr>
+            <p:ph type="sldNum" sz="quarter" idx="10"/>
+          </p:nvPr>
+        </p:nvSpPr>
+        <p:spPr/>
+        <p:txBody>
+          <a:bodyPr/>
+          <a:lstStyle/>
+          <a:p>
+            <a:fld id="{B54DC83E-89B8-4806-9A94-7D2BAA520DC6}" type="slidenum">
+              <a:rPr lang="en-US" smtClean="0"/>
+              <a:pPr/>
+              <a:t>12</a:t>
+            </a:fld>
+            <a:endParaRPr lang="en-US" dirty="0"/>
+          </a:p>
+        </p:txBody>
+      </p:sp>
+      <p:sp>
+        <p:nvSpPr>
+          <p:cNvPr id="9" name="Slide Image Placeholder 8">
+            <a:extLst>
+              <a:ext uri="{FF2B5EF4-FFF2-40B4-BE49-F238E27FC236}">
+                <a16:creationId xmlns:a16="http://schemas.microsoft.com/office/drawing/2014/main" id="{575F3113-3832-4943-A158-8D65E8EC31DA}"/>
+              </a:ext>
+            </a:extLst>
+          </p:cNvPr>
           <p:cNvSpPr>
             <a:spLocks noGrp="1" noRot="1" noChangeAspect="1"/>
           </p:cNvSpPr>
@@ -5719,7 +4932,13 @@
       </p:sp>
       <p:sp>
         <p:nvSpPr>
-          <p:cNvPr id="3" name="Notes Placeholder 2"/>
+          <p:cNvPr id="10" name="Notes Placeholder 9">
+            <a:extLst>
+              <a:ext uri="{FF2B5EF4-FFF2-40B4-BE49-F238E27FC236}">
+                <a16:creationId xmlns:a16="http://schemas.microsoft.com/office/drawing/2014/main" id="{9C4D8084-0CF4-451C-A8FF-83CAF6A380FD}"/>
+              </a:ext>
+            </a:extLst>
+          </p:cNvPr>
           <p:cNvSpPr>
             <a:spLocks noGrp="1"/>
           </p:cNvSpPr>
@@ -5736,33 +4955,10 @@
           </a:p>
         </p:txBody>
       </p:sp>
-      <p:sp>
-        <p:nvSpPr>
-          <p:cNvPr id="4" name="Slide Number Placeholder 3"/>
-          <p:cNvSpPr>
-            <a:spLocks noGrp="1"/>
-          </p:cNvSpPr>
-          <p:nvPr>
-            <p:ph type="sldNum" sz="quarter" idx="5"/>
-          </p:nvPr>
-        </p:nvSpPr>
-        <p:spPr/>
-        <p:txBody>
-          <a:bodyPr/>
-          <a:lstStyle/>
-          <a:p>
-            <a:fld id="{62B4F2D4-6104-46A2-B90A-3C360EC68CD7}" type="slidenum">
-              <a:rPr lang="en-US" smtClean="0"/>
-              <a:t>12</a:t>
-            </a:fld>
-            <a:endParaRPr lang="en-US" dirty="0"/>
-          </a:p>
-        </p:txBody>
-      </p:sp>
     </p:spTree>
     <p:extLst>
       <p:ext uri="{BB962C8B-B14F-4D97-AF65-F5344CB8AC3E}">
-        <p14:creationId xmlns:p14="http://schemas.microsoft.com/office/powerpoint/2010/main" val="1359477545"/>
+        <p14:creationId xmlns:p14="http://schemas.microsoft.com/office/powerpoint/2010/main" val="1993847021"/>
       </p:ext>
     </p:extLst>
   </p:cSld>
@@ -5791,43 +4987,7 @@
       </p:grpSpPr>
       <p:sp>
         <p:nvSpPr>
-          <p:cNvPr id="2" name="Slide Image Placeholder 1"/>
-          <p:cNvSpPr>
-            <a:spLocks noGrp="1" noRot="1" noChangeAspect="1"/>
-          </p:cNvSpPr>
-          <p:nvPr>
-            <p:ph type="sldImg"/>
-          </p:nvPr>
-        </p:nvSpPr>
-        <p:spPr>
-          <a:xfrm>
-            <a:off x="1682750" y="457200"/>
-            <a:ext cx="3657600" cy="2743200"/>
-          </a:xfrm>
-        </p:spPr>
-      </p:sp>
-      <p:sp>
-        <p:nvSpPr>
-          <p:cNvPr id="3" name="Notes Placeholder 2"/>
-          <p:cNvSpPr>
-            <a:spLocks noGrp="1"/>
-          </p:cNvSpPr>
-          <p:nvPr>
-            <p:ph type="body" idx="1"/>
-          </p:nvPr>
-        </p:nvSpPr>
-        <p:spPr/>
-        <p:txBody>
-          <a:bodyPr/>
-          <a:lstStyle/>
-          <a:p>
-            <a:endParaRPr lang="en-US" dirty="0"/>
-          </a:p>
-        </p:txBody>
-      </p:sp>
-      <p:sp>
-        <p:nvSpPr>
-          <p:cNvPr id="4" name="Slide Number Placeholder 3"/>
+          <p:cNvPr id="5" name="Slide Number Placeholder 4"/>
           <p:cNvSpPr>
             <a:spLocks noGrp="1"/>
           </p:cNvSpPr>
@@ -5840,63 +5000,10 @@
           <a:bodyPr/>
           <a:lstStyle/>
           <a:p>
-            <a:fld id="{62B4F2D4-6104-46A2-B90A-3C360EC68CD7}" type="slidenum">
-              <a:rPr lang="en-US" smtClean="0"/>
-              <a:t>13</a:t>
-            </a:fld>
-            <a:endParaRPr lang="en-US" dirty="0"/>
-          </a:p>
-        </p:txBody>
-      </p:sp>
-    </p:spTree>
-    <p:extLst>
-      <p:ext uri="{BB962C8B-B14F-4D97-AF65-F5344CB8AC3E}">
-        <p14:creationId xmlns:p14="http://schemas.microsoft.com/office/powerpoint/2010/main" val="960062178"/>
-      </p:ext>
-    </p:extLst>
-  </p:cSld>
-  <p:clrMapOvr>
-    <a:masterClrMapping/>
-  </p:clrMapOvr>
-</p:notes>
-</file>
-
-<file path=ppt/notesSlides/notesSlide13.xml><?xml version="1.0" encoding="utf-8"?>
-<p:notes xmlns:a="http://schemas.openxmlformats.org/drawingml/2006/main" xmlns:r="http://schemas.openxmlformats.org/officeDocument/2006/relationships" xmlns:p="http://schemas.openxmlformats.org/presentationml/2006/main">
-  <p:cSld>
-    <p:spTree>
-      <p:nvGrpSpPr>
-        <p:cNvPr id="1" name=""/>
-        <p:cNvGrpSpPr/>
-        <p:nvPr/>
-      </p:nvGrpSpPr>
-      <p:grpSpPr>
-        <a:xfrm>
-          <a:off x="0" y="0"/>
-          <a:ext cx="0" cy="0"/>
-          <a:chOff x="0" y="0"/>
-          <a:chExt cx="0" cy="0"/>
-        </a:xfrm>
-      </p:grpSpPr>
-      <p:sp>
-        <p:nvSpPr>
-          <p:cNvPr id="4" name="Slide Number Placeholder 3"/>
-          <p:cNvSpPr>
-            <a:spLocks noGrp="1"/>
-          </p:cNvSpPr>
-          <p:nvPr>
-            <p:ph type="sldNum" sz="quarter" idx="10"/>
-          </p:nvPr>
-        </p:nvSpPr>
-        <p:spPr/>
-        <p:txBody>
-          <a:bodyPr/>
-          <a:lstStyle/>
-          <a:p>
             <a:fld id="{B54DC83E-89B8-4806-9A94-7D2BAA520DC6}" type="slidenum">
               <a:rPr lang="en-US" smtClean="0"/>
               <a:pPr/>
-              <a:t>15</a:t>
+              <a:t>14</a:t>
             </a:fld>
             <a:endParaRPr lang="en-US" dirty="0"/>
           </a:p>
@@ -5907,7 +5014,7 @@
           <p:cNvPr id="8" name="Slide Image Placeholder 7">
             <a:extLst>
               <a:ext uri="{FF2B5EF4-FFF2-40B4-BE49-F238E27FC236}">
-                <a16:creationId xmlns:a16="http://schemas.microsoft.com/office/drawing/2014/main" id="{6E17FE10-0D48-47FC-9240-CF3FA01F62FB}"/>
+                <a16:creationId xmlns:a16="http://schemas.microsoft.com/office/drawing/2014/main" id="{A4E7990B-6684-445C-A074-15844361109B}"/>
               </a:ext>
             </a:extLst>
           </p:cNvPr>
@@ -5930,7 +5037,7 @@
           <p:cNvPr id="9" name="Notes Placeholder 8">
             <a:extLst>
               <a:ext uri="{FF2B5EF4-FFF2-40B4-BE49-F238E27FC236}">
-                <a16:creationId xmlns:a16="http://schemas.microsoft.com/office/drawing/2014/main" id="{6139E39D-E74C-4B6E-9B50-FBABB0B8340A}"/>
+                <a16:creationId xmlns:a16="http://schemas.microsoft.com/office/drawing/2014/main" id="{7AEF52FF-E2BF-4070-9C15-27C46FC509C7}"/>
               </a:ext>
             </a:extLst>
           </p:cNvPr>
@@ -5953,284 +5060,7 @@
     </p:spTree>
     <p:extLst>
       <p:ext uri="{BB962C8B-B14F-4D97-AF65-F5344CB8AC3E}">
-        <p14:creationId xmlns:p14="http://schemas.microsoft.com/office/powerpoint/2010/main" val="972245025"/>
-      </p:ext>
-    </p:extLst>
-  </p:cSld>
-  <p:clrMapOvr>
-    <a:masterClrMapping/>
-  </p:clrMapOvr>
-</p:notes>
-</file>
-
-<file path=ppt/notesSlides/notesSlide14.xml><?xml version="1.0" encoding="utf-8"?>
-<p:notes xmlns:a="http://schemas.openxmlformats.org/drawingml/2006/main" xmlns:r="http://schemas.openxmlformats.org/officeDocument/2006/relationships" xmlns:p="http://schemas.openxmlformats.org/presentationml/2006/main">
-  <p:cSld>
-    <p:spTree>
-      <p:nvGrpSpPr>
-        <p:cNvPr id="1" name=""/>
-        <p:cNvGrpSpPr/>
-        <p:nvPr/>
-      </p:nvGrpSpPr>
-      <p:grpSpPr>
-        <a:xfrm>
-          <a:off x="0" y="0"/>
-          <a:ext cx="0" cy="0"/>
-          <a:chOff x="0" y="0"/>
-          <a:chExt cx="0" cy="0"/>
-        </a:xfrm>
-      </p:grpSpPr>
-      <p:sp>
-        <p:nvSpPr>
-          <p:cNvPr id="2" name="Slide Image Placeholder 1"/>
-          <p:cNvSpPr>
-            <a:spLocks noGrp="1" noRot="1" noChangeAspect="1"/>
-          </p:cNvSpPr>
-          <p:nvPr>
-            <p:ph type="sldImg"/>
-          </p:nvPr>
-        </p:nvSpPr>
-        <p:spPr>
-          <a:xfrm>
-            <a:off x="1682750" y="457200"/>
-            <a:ext cx="3657600" cy="2743200"/>
-          </a:xfrm>
-        </p:spPr>
-      </p:sp>
-      <p:sp>
-        <p:nvSpPr>
-          <p:cNvPr id="3" name="Notes Placeholder 2"/>
-          <p:cNvSpPr>
-            <a:spLocks noGrp="1"/>
-          </p:cNvSpPr>
-          <p:nvPr>
-            <p:ph type="body" idx="1"/>
-          </p:nvPr>
-        </p:nvSpPr>
-        <p:spPr/>
-        <p:txBody>
-          <a:bodyPr/>
-          <a:lstStyle/>
-          <a:p>
-            <a:endParaRPr lang="en-US" dirty="0"/>
-          </a:p>
-        </p:txBody>
-      </p:sp>
-      <p:sp>
-        <p:nvSpPr>
-          <p:cNvPr id="4" name="Slide Number Placeholder 3"/>
-          <p:cNvSpPr>
-            <a:spLocks noGrp="1"/>
-          </p:cNvSpPr>
-          <p:nvPr>
-            <p:ph type="sldNum" sz="quarter" idx="5"/>
-          </p:nvPr>
-        </p:nvSpPr>
-        <p:spPr/>
-        <p:txBody>
-          <a:bodyPr/>
-          <a:lstStyle/>
-          <a:p>
-            <a:fld id="{B54DC83E-89B8-4806-9A94-7D2BAA520DC6}" type="slidenum">
-              <a:rPr lang="en-US" smtClean="0"/>
-              <a:pPr/>
-              <a:t>16</a:t>
-            </a:fld>
-            <a:endParaRPr lang="en-US" dirty="0"/>
-          </a:p>
-        </p:txBody>
-      </p:sp>
-    </p:spTree>
-    <p:extLst>
-      <p:ext uri="{BB962C8B-B14F-4D97-AF65-F5344CB8AC3E}">
-        <p14:creationId xmlns:p14="http://schemas.microsoft.com/office/powerpoint/2010/main" val="166309108"/>
-      </p:ext>
-    </p:extLst>
-  </p:cSld>
-  <p:clrMapOvr>
-    <a:masterClrMapping/>
-  </p:clrMapOvr>
-</p:notes>
-</file>
-
-<file path=ppt/notesSlides/notesSlide15.xml><?xml version="1.0" encoding="utf-8"?>
-<p:notes xmlns:a="http://schemas.openxmlformats.org/drawingml/2006/main" xmlns:r="http://schemas.openxmlformats.org/officeDocument/2006/relationships" xmlns:p="http://schemas.openxmlformats.org/presentationml/2006/main">
-  <p:cSld>
-    <p:spTree>
-      <p:nvGrpSpPr>
-        <p:cNvPr id="1" name=""/>
-        <p:cNvGrpSpPr/>
-        <p:nvPr/>
-      </p:nvGrpSpPr>
-      <p:grpSpPr>
-        <a:xfrm>
-          <a:off x="0" y="0"/>
-          <a:ext cx="0" cy="0"/>
-          <a:chOff x="0" y="0"/>
-          <a:chExt cx="0" cy="0"/>
-        </a:xfrm>
-      </p:grpSpPr>
-      <p:sp>
-        <p:nvSpPr>
-          <p:cNvPr id="5" name="Slide Number Placeholder 4"/>
-          <p:cNvSpPr>
-            <a:spLocks noGrp="1"/>
-          </p:cNvSpPr>
-          <p:nvPr>
-            <p:ph type="sldNum" sz="quarter" idx="5"/>
-          </p:nvPr>
-        </p:nvSpPr>
-        <p:spPr/>
-        <p:txBody>
-          <a:bodyPr/>
-          <a:lstStyle/>
-          <a:p>
-            <a:fld id="{B54DC83E-89B8-4806-9A94-7D2BAA520DC6}" type="slidenum">
-              <a:rPr lang="en-US" smtClean="0"/>
-              <a:pPr/>
-              <a:t>17</a:t>
-            </a:fld>
-            <a:endParaRPr lang="en-US" dirty="0"/>
-          </a:p>
-        </p:txBody>
-      </p:sp>
-      <p:sp>
-        <p:nvSpPr>
-          <p:cNvPr id="8" name="Slide Image Placeholder 7">
-            <a:extLst>
-              <a:ext uri="{FF2B5EF4-FFF2-40B4-BE49-F238E27FC236}">
-                <a16:creationId xmlns:a16="http://schemas.microsoft.com/office/drawing/2014/main" id="{A4E7990B-6684-445C-A074-15844361109B}"/>
-              </a:ext>
-            </a:extLst>
-          </p:cNvPr>
-          <p:cNvSpPr>
-            <a:spLocks noGrp="1" noRot="1" noChangeAspect="1"/>
-          </p:cNvSpPr>
-          <p:nvPr>
-            <p:ph type="sldImg"/>
-          </p:nvPr>
-        </p:nvSpPr>
-        <p:spPr>
-          <a:xfrm>
-            <a:off x="1682750" y="457200"/>
-            <a:ext cx="3657600" cy="2743200"/>
-          </a:xfrm>
-        </p:spPr>
-      </p:sp>
-      <p:sp>
-        <p:nvSpPr>
-          <p:cNvPr id="9" name="Notes Placeholder 8">
-            <a:extLst>
-              <a:ext uri="{FF2B5EF4-FFF2-40B4-BE49-F238E27FC236}">
-                <a16:creationId xmlns:a16="http://schemas.microsoft.com/office/drawing/2014/main" id="{7AEF52FF-E2BF-4070-9C15-27C46FC509C7}"/>
-              </a:ext>
-            </a:extLst>
-          </p:cNvPr>
-          <p:cNvSpPr>
-            <a:spLocks noGrp="1"/>
-          </p:cNvSpPr>
-          <p:nvPr>
-            <p:ph type="body" idx="1"/>
-          </p:nvPr>
-        </p:nvSpPr>
-        <p:spPr/>
-        <p:txBody>
-          <a:bodyPr/>
-          <a:lstStyle/>
-          <a:p>
-            <a:endParaRPr lang="en-US" dirty="0"/>
-          </a:p>
-        </p:txBody>
-      </p:sp>
-    </p:spTree>
-    <p:extLst>
-      <p:ext uri="{BB962C8B-B14F-4D97-AF65-F5344CB8AC3E}">
         <p14:creationId xmlns:p14="http://schemas.microsoft.com/office/powerpoint/2010/main" val="1743892057"/>
-      </p:ext>
-    </p:extLst>
-  </p:cSld>
-  <p:clrMapOvr>
-    <a:masterClrMapping/>
-  </p:clrMapOvr>
-</p:notes>
-</file>
-
-<file path=ppt/notesSlides/notesSlide16.xml><?xml version="1.0" encoding="utf-8"?>
-<p:notes xmlns:a="http://schemas.openxmlformats.org/drawingml/2006/main" xmlns:r="http://schemas.openxmlformats.org/officeDocument/2006/relationships" xmlns:p="http://schemas.openxmlformats.org/presentationml/2006/main">
-  <p:cSld>
-    <p:spTree>
-      <p:nvGrpSpPr>
-        <p:cNvPr id="1" name=""/>
-        <p:cNvGrpSpPr/>
-        <p:nvPr/>
-      </p:nvGrpSpPr>
-      <p:grpSpPr>
-        <a:xfrm>
-          <a:off x="0" y="0"/>
-          <a:ext cx="0" cy="0"/>
-          <a:chOff x="0" y="0"/>
-          <a:chExt cx="0" cy="0"/>
-        </a:xfrm>
-      </p:grpSpPr>
-      <p:sp>
-        <p:nvSpPr>
-          <p:cNvPr id="2" name="Slide Image Placeholder 1"/>
-          <p:cNvSpPr>
-            <a:spLocks noGrp="1" noRot="1" noChangeAspect="1"/>
-          </p:cNvSpPr>
-          <p:nvPr>
-            <p:ph type="sldImg"/>
-          </p:nvPr>
-        </p:nvSpPr>
-        <p:spPr/>
-      </p:sp>
-      <p:sp>
-        <p:nvSpPr>
-          <p:cNvPr id="3" name="Notes Placeholder 2"/>
-          <p:cNvSpPr>
-            <a:spLocks noGrp="1"/>
-          </p:cNvSpPr>
-          <p:nvPr>
-            <p:ph type="body" idx="1"/>
-          </p:nvPr>
-        </p:nvSpPr>
-        <p:spPr/>
-        <p:txBody>
-          <a:bodyPr/>
-          <a:lstStyle/>
-          <a:p>
-            <a:endParaRPr lang="en-US" dirty="0"/>
-          </a:p>
-        </p:txBody>
-      </p:sp>
-      <p:sp>
-        <p:nvSpPr>
-          <p:cNvPr id="4" name="Slide Number Placeholder 3"/>
-          <p:cNvSpPr>
-            <a:spLocks noGrp="1"/>
-          </p:cNvSpPr>
-          <p:nvPr>
-            <p:ph type="sldNum" sz="quarter" idx="5"/>
-          </p:nvPr>
-        </p:nvSpPr>
-        <p:spPr/>
-        <p:txBody>
-          <a:bodyPr/>
-          <a:lstStyle/>
-          <a:p>
-            <a:fld id="{B54DC83E-89B8-4806-9A94-7D2BAA520DC6}" type="slidenum">
-              <a:rPr lang="en-US" smtClean="0"/>
-              <a:pPr/>
-              <a:t>18</a:t>
-            </a:fld>
-            <a:endParaRPr lang="en-US" dirty="0"/>
-          </a:p>
-        </p:txBody>
-      </p:sp>
-    </p:spTree>
-    <p:extLst>
-      <p:ext uri="{BB962C8B-B14F-4D97-AF65-F5344CB8AC3E}">
-        <p14:creationId xmlns:p14="http://schemas.microsoft.com/office/powerpoint/2010/main" val="2961441505"/>
       </p:ext>
     </p:extLst>
   </p:cSld>
@@ -6709,7 +5539,41 @@
           <a:bodyPr/>
           <a:lstStyle/>
           <a:p>
+            <a:r>
+              <a:rPr lang="en-US" dirty="0"/>
+              <a:t>Bookdown is a file format extended from R Markdown</a:t>
+            </a:r>
+          </a:p>
+          <a:p>
+            <a:r>
+              <a:rPr lang="en-US" dirty="0"/>
+              <a:t>No code is technically needed for simple use cases (</a:t>
+            </a:r>
+            <a:r>
+              <a:rPr lang="en-US" dirty="0" err="1"/>
+              <a:t>eg</a:t>
+            </a:r>
+            <a:r>
+              <a:rPr lang="en-US" dirty="0"/>
+              <a:t>, text only) but it is very helpful in order to take full advantage</a:t>
+            </a:r>
+          </a:p>
+          <a:p>
+            <a:r>
+              <a:rPr lang="en-US" dirty="0"/>
+              <a:t>To deploy on a website, you need some code and at least </a:t>
+            </a:r>
+            <a:r>
+              <a:rPr lang="en-US" dirty="0" err="1"/>
+              <a:t>Github</a:t>
+            </a:r>
             <a:endParaRPr lang="en-US" dirty="0"/>
+          </a:p>
+          <a:p>
+            <a:r>
+              <a:rPr lang="en-US" dirty="0"/>
+              <a:t>When not to use bookdown?</a:t>
+            </a:r>
           </a:p>
         </p:txBody>
       </p:sp>
@@ -29850,13 +28714,7 @@
       </p:grpSpPr>
       <p:sp>
         <p:nvSpPr>
-          <p:cNvPr id="2" name="Title 1">
-            <a:extLst>
-              <a:ext uri="{FF2B5EF4-FFF2-40B4-BE49-F238E27FC236}">
-                <a16:creationId xmlns:a16="http://schemas.microsoft.com/office/drawing/2014/main" id="{9D6B37F0-7954-B949-AD83-C6A01758BCF3}"/>
-              </a:ext>
-            </a:extLst>
-          </p:cNvPr>
+          <p:cNvPr id="5" name="Title 4"/>
           <p:cNvSpPr>
             <a:spLocks noGrp="1"/>
           </p:cNvSpPr>
@@ -29871,121 +28729,74 @@
           <a:p>
             <a:r>
               <a:rPr lang="en-US" dirty="0"/>
-              <a:t>Photo Right Layout Dark</a:t>
+              <a:t>Publishing online</a:t>
             </a:r>
           </a:p>
         </p:txBody>
       </p:sp>
       <p:sp>
         <p:nvSpPr>
-          <p:cNvPr id="5" name="Text Placeholder 4">
-            <a:extLst>
-              <a:ext uri="{FF2B5EF4-FFF2-40B4-BE49-F238E27FC236}">
-                <a16:creationId xmlns:a16="http://schemas.microsoft.com/office/drawing/2014/main" id="{135C61E6-2213-479D-AC9B-177302BC58EE}"/>
-              </a:ext>
-              <a:ext uri="{C183D7F6-B498-43B3-948B-1728B52AA6E4}">
-                <adec:decorative xmlns:adec="http://schemas.microsoft.com/office/drawing/2017/decorative" val="1"/>
-              </a:ext>
-            </a:extLst>
-          </p:cNvPr>
+          <p:cNvPr id="9" name="Content Placeholder 8"/>
           <p:cNvSpPr>
             <a:spLocks noGrp="1"/>
           </p:cNvSpPr>
           <p:nvPr>
-            <p:ph type="body" sz="quarter" idx="20"/>
+            <p:ph sz="half" idx="1"/>
           </p:nvPr>
         </p:nvSpPr>
-        <p:spPr/>
+        <p:spPr>
+          <a:xfrm>
+            <a:off x="342901" y="1307592"/>
+            <a:ext cx="2664460" cy="4498848"/>
+          </a:xfrm>
+        </p:spPr>
         <p:txBody>
           <a:bodyPr/>
           <a:lstStyle/>
           <a:p>
-            <a:endParaRPr lang="en-US"/>
+            <a:pPr lvl="0"/>
+            <a:r>
+              <a:rPr lang="en-US" dirty="0"/>
+              <a:t>Accessibility</a:t>
+            </a:r>
+          </a:p>
+          <a:p>
+            <a:pPr lvl="1"/>
+            <a:r>
+              <a:rPr lang="en-US" dirty="0"/>
+              <a:t>Can output in both PDF and website formats</a:t>
+            </a:r>
+          </a:p>
+          <a:p>
+            <a:pPr lvl="0"/>
+            <a:r>
+              <a:rPr lang="en-US" dirty="0"/>
+              <a:t>Crowd-sourced edits</a:t>
+            </a:r>
+          </a:p>
+          <a:p>
+            <a:pPr lvl="1"/>
+            <a:r>
+              <a:rPr lang="en-US" dirty="0"/>
+              <a:t>Any </a:t>
+            </a:r>
+            <a:r>
+              <a:rPr lang="en-US" dirty="0" err="1"/>
+              <a:t>Github</a:t>
+            </a:r>
+            <a:r>
+              <a:rPr lang="en-US" dirty="0"/>
+              <a:t> user can add comments or make suggested edits directly</a:t>
+            </a:r>
           </a:p>
         </p:txBody>
       </p:sp>
       <p:sp>
         <p:nvSpPr>
-          <p:cNvPr id="4" name="Picture Placeholder 3">
+          <p:cNvPr id="11" name="Text Placeholder 10">
             <a:extLst>
               <a:ext uri="{FF2B5EF4-FFF2-40B4-BE49-F238E27FC236}">
-                <a16:creationId xmlns:a16="http://schemas.microsoft.com/office/drawing/2014/main" id="{E453F321-C116-4D22-B195-832AB0E3CDC5}"/>
-              </a:ext>
-              <a:ext uri="{C183D7F6-B498-43B3-948B-1728B52AA6E4}">
-                <adec:decorative xmlns:adec="http://schemas.microsoft.com/office/drawing/2017/decorative" val="1"/>
-              </a:ext>
-            </a:extLst>
-          </p:cNvPr>
-          <p:cNvSpPr>
-            <a:spLocks noGrp="1"/>
-          </p:cNvSpPr>
-          <p:nvPr>
-            <p:ph type="pic" sz="quarter" idx="15"/>
-          </p:nvPr>
-        </p:nvSpPr>
-        <p:spPr/>
-        <p:txBody>
-          <a:bodyPr/>
-          <a:lstStyle/>
-          <a:p>
-            <a:endParaRPr lang="en-US"/>
-          </a:p>
-        </p:txBody>
-      </p:sp>
-      <p:sp>
-        <p:nvSpPr>
-          <p:cNvPr id="3" name="Content Placeholder 2">
-            <a:extLst>
-              <a:ext uri="{FF2B5EF4-FFF2-40B4-BE49-F238E27FC236}">
-                <a16:creationId xmlns:a16="http://schemas.microsoft.com/office/drawing/2014/main" id="{3A5AFDC3-4D66-1848-A0C3-BEBEFA0CD68C}"/>
-              </a:ext>
-            </a:extLst>
-          </p:cNvPr>
-          <p:cNvSpPr>
-            <a:spLocks noGrp="1"/>
-          </p:cNvSpPr>
-          <p:nvPr>
-            <p:ph sz="quarter" idx="19"/>
-          </p:nvPr>
-        </p:nvSpPr>
-        <p:spPr/>
-        <p:txBody>
-          <a:bodyPr>
-            <a:normAutofit fontScale="92500" lnSpcReduction="10000"/>
-          </a:bodyPr>
-          <a:lstStyle/>
-          <a:p>
-            <a:r>
-              <a:rPr lang="en-US" dirty="0"/>
-              <a:t>Use lower resolution photos to keep file size down (150 to 220 dpi).</a:t>
-            </a:r>
-          </a:p>
-          <a:p>
-            <a:r>
-              <a:rPr lang="en-US" dirty="0"/>
-              <a:t>Photos will resize to fit the placeholder.</a:t>
-            </a:r>
-          </a:p>
-          <a:p>
-            <a:r>
-              <a:rPr lang="en-US" dirty="0"/>
-              <a:t>Do not drag “handles” to resize the picture. Use the Picture Tools, Size dialog box, and be sure that “Lock aspect ratio” is selected before resizing.</a:t>
-            </a:r>
-          </a:p>
-          <a:p>
-            <a:r>
-              <a:rPr lang="en-US" dirty="0"/>
-              <a:t>Photos that match the aspect ratio (height/width) of the placeholder work best.</a:t>
-            </a:r>
-          </a:p>
-        </p:txBody>
-      </p:sp>
-      <p:sp>
-        <p:nvSpPr>
-          <p:cNvPr id="7" name="Text Placeholder 6">
-            <a:extLst>
-              <a:ext uri="{FF2B5EF4-FFF2-40B4-BE49-F238E27FC236}">
-                <a16:creationId xmlns:a16="http://schemas.microsoft.com/office/drawing/2014/main" id="{65263E77-891F-4C1A-A932-5793775DC810}"/>
+                <a16:creationId xmlns:a16="http://schemas.microsoft.com/office/drawing/2014/main" id="{78FAC934-9CF7-4D36-8A69-A28FD3A05669}"/>
               </a:ext>
             </a:extLst>
           </p:cNvPr>
@@ -29998,22 +28809,28 @@
         </p:nvSpPr>
         <p:spPr/>
         <p:txBody>
-          <a:bodyPr/>
+          <a:bodyPr>
+            <a:noAutofit/>
+          </a:bodyPr>
           <a:lstStyle/>
           <a:p>
             <a:r>
-              <a:rPr lang="en-US" dirty="0"/>
-              <a:t>Note. Placeholder for notes, sources, and permissions (if needed). “Note.” (including a period) is italicized.</a:t>
+              <a:rPr lang="en-US" i="1" dirty="0"/>
+              <a:t>Note.</a:t>
+            </a:r>
+            <a:r>
+              <a:rPr lang="en-US" dirty="0"/>
+              <a:t> Placeholder for notes, sources, and permissions (if needed). “Note.” (including a period) is italicized.</a:t>
             </a:r>
           </a:p>
         </p:txBody>
       </p:sp>
       <p:sp>
         <p:nvSpPr>
-          <p:cNvPr id="6" name="Slide Number Placeholder 5">
+          <p:cNvPr id="3" name="Slide Number Placeholder 2">
             <a:extLst>
               <a:ext uri="{FF2B5EF4-FFF2-40B4-BE49-F238E27FC236}">
-                <a16:creationId xmlns:a16="http://schemas.microsoft.com/office/drawing/2014/main" id="{E3F46BD4-293E-43B5-9CB3-6BCB06929B84}"/>
+                <a16:creationId xmlns:a16="http://schemas.microsoft.com/office/drawing/2014/main" id="{F39B6279-A62D-4C12-BD1E-5E9C7D1FB9B2}"/>
               </a:ext>
             </a:extLst>
           </p:cNvPr>
@@ -30021,7 +28838,7 @@
             <a:spLocks noGrp="1"/>
           </p:cNvSpPr>
           <p:nvPr>
-            <p:ph type="sldNum" sz="quarter" idx="21"/>
+            <p:ph type="sldNum" sz="quarter" idx="18"/>
           </p:nvPr>
         </p:nvSpPr>
         <p:spPr/>
@@ -30038,10 +28855,40 @@
           </a:p>
         </p:txBody>
       </p:sp>
+      <p:pic>
+        <p:nvPicPr>
+          <p:cNvPr id="4" name="Picture 3">
+            <a:extLst>
+              <a:ext uri="{FF2B5EF4-FFF2-40B4-BE49-F238E27FC236}">
+                <a16:creationId xmlns:a16="http://schemas.microsoft.com/office/drawing/2014/main" id="{765A9ACD-8B69-55CB-AC7E-60DD9A84BA6C}"/>
+              </a:ext>
+            </a:extLst>
+          </p:cNvPr>
+          <p:cNvPicPr>
+            <a:picLocks noChangeAspect="1"/>
+          </p:cNvPicPr>
+          <p:nvPr/>
+        </p:nvPicPr>
+        <p:blipFill>
+          <a:blip r:embed="rId3"/>
+          <a:stretch>
+            <a:fillRect/>
+          </a:stretch>
+        </p:blipFill>
+        <p:spPr>
+          <a:xfrm>
+            <a:off x="3373342" y="1648672"/>
+            <a:ext cx="5770658" cy="3241391"/>
+          </a:xfrm>
+          <a:prstGeom prst="rect">
+            <a:avLst/>
+          </a:prstGeom>
+        </p:spPr>
+      </p:pic>
     </p:spTree>
     <p:extLst>
       <p:ext uri="{BB962C8B-B14F-4D97-AF65-F5344CB8AC3E}">
-        <p14:creationId xmlns:p14="http://schemas.microsoft.com/office/powerpoint/2010/main" val="1884256070"/>
+        <p14:creationId xmlns:p14="http://schemas.microsoft.com/office/powerpoint/2010/main" val="3023023630"/>
       </p:ext>
     </p:extLst>
   </p:cSld>
@@ -30070,41 +28917,7 @@
       </p:grpSpPr>
       <p:sp>
         <p:nvSpPr>
-          <p:cNvPr id="4" name="Picture Placeholder 3">
-            <a:extLst>
-              <a:ext uri="{FF2B5EF4-FFF2-40B4-BE49-F238E27FC236}">
-                <a16:creationId xmlns:a16="http://schemas.microsoft.com/office/drawing/2014/main" id="{4A774F8D-A0D6-4958-B83E-47B7A012DCF2}"/>
-              </a:ext>
-              <a:ext uri="{C183D7F6-B498-43B3-948B-1728B52AA6E4}">
-                <adec:decorative xmlns:adec="http://schemas.microsoft.com/office/drawing/2017/decorative" val="1"/>
-              </a:ext>
-            </a:extLst>
-          </p:cNvPr>
-          <p:cNvSpPr>
-            <a:spLocks noGrp="1"/>
-          </p:cNvSpPr>
-          <p:nvPr>
-            <p:ph type="pic" sz="quarter" idx="15"/>
-          </p:nvPr>
-        </p:nvSpPr>
-        <p:spPr/>
-        <p:txBody>
-          <a:bodyPr/>
-          <a:lstStyle/>
-          <a:p>
-            <a:endParaRPr lang="en-US"/>
-          </a:p>
-        </p:txBody>
-      </p:sp>
-      <p:sp>
-        <p:nvSpPr>
-          <p:cNvPr id="2" name="Title 1">
-            <a:extLst>
-              <a:ext uri="{FF2B5EF4-FFF2-40B4-BE49-F238E27FC236}">
-                <a16:creationId xmlns:a16="http://schemas.microsoft.com/office/drawing/2014/main" id="{9D6B37F0-7954-B949-AD83-C6A01758BCF3}"/>
-              </a:ext>
-            </a:extLst>
-          </p:cNvPr>
+          <p:cNvPr id="5" name="Title 4"/>
           <p:cNvSpPr>
             <a:spLocks noGrp="1"/>
           </p:cNvSpPr>
@@ -30117,67 +28930,62 @@
           <a:bodyPr/>
           <a:lstStyle/>
           <a:p>
-            <a:r>
-              <a:rPr lang="en-US" dirty="0"/>
-              <a:t>Photo Left Layout Dark</a:t>
+            <a:pPr lvl="0"/>
+            <a:r>
+              <a:rPr lang="en-US" dirty="0"/>
+              <a:t>Try it yourself!</a:t>
             </a:r>
           </a:p>
         </p:txBody>
       </p:sp>
       <p:sp>
         <p:nvSpPr>
-          <p:cNvPr id="3" name="Content Placeholder 2">
-            <a:extLst>
-              <a:ext uri="{FF2B5EF4-FFF2-40B4-BE49-F238E27FC236}">
-                <a16:creationId xmlns:a16="http://schemas.microsoft.com/office/drawing/2014/main" id="{3A5AFDC3-4D66-1848-A0C3-BEBEFA0CD68C}"/>
-              </a:ext>
-            </a:extLst>
-          </p:cNvPr>
+          <p:cNvPr id="9" name="Content Placeholder 8"/>
           <p:cNvSpPr>
             <a:spLocks noGrp="1"/>
           </p:cNvSpPr>
           <p:nvPr>
-            <p:ph sz="quarter" idx="19"/>
+            <p:ph sz="half" idx="1"/>
           </p:nvPr>
         </p:nvSpPr>
-        <p:spPr/>
+        <p:spPr>
+          <a:xfrm>
+            <a:off x="342900" y="1307592"/>
+            <a:ext cx="8255816" cy="1277112"/>
+          </a:xfrm>
+        </p:spPr>
         <p:txBody>
-          <a:bodyPr>
-            <a:normAutofit/>
-          </a:bodyPr>
+          <a:bodyPr/>
           <a:lstStyle/>
           <a:p>
             <a:r>
               <a:rPr lang="en-US" dirty="0"/>
-              <a:t>Use lower resolution photos to keep file size down (150 to 220 dpi).</a:t>
-            </a:r>
-          </a:p>
-          <a:p>
-            <a:r>
-              <a:rPr lang="en-US" dirty="0"/>
-              <a:t>Photos will resize to fit the placeholder.</a:t>
-            </a:r>
-          </a:p>
-          <a:p>
-            <a:r>
-              <a:rPr lang="en-US" dirty="0"/>
-              <a:t>Do not drag “handles” to resize the picture. Use the Picture Tools, Size dialog box, and be sure that “Lock aspect ratio” is selected before resizing.</a:t>
-            </a:r>
-          </a:p>
-          <a:p>
-            <a:r>
-              <a:rPr lang="en-US" dirty="0"/>
-              <a:t>Photos that match the aspect ratio (height/width) of the placeholder work best.</a:t>
-            </a:r>
+              <a:t>Clone our repository</a:t>
+            </a:r>
+          </a:p>
+          <a:p>
+            <a:r>
+              <a:rPr lang="en-US" dirty="0"/>
+              <a:t>Or, start your own bookdown project</a:t>
+            </a:r>
+          </a:p>
+          <a:p>
+            <a:pPr marL="180022" lvl="1" indent="0">
+              <a:buNone/>
+            </a:pPr>
+            <a:endParaRPr lang="en-US" dirty="0"/>
+          </a:p>
+          <a:p>
+            <a:endParaRPr lang="en-US" dirty="0"/>
           </a:p>
         </p:txBody>
       </p:sp>
       <p:sp>
         <p:nvSpPr>
-          <p:cNvPr id="10" name="Text Placeholder 9">
+          <p:cNvPr id="11" name="Text Placeholder 10">
             <a:extLst>
               <a:ext uri="{FF2B5EF4-FFF2-40B4-BE49-F238E27FC236}">
-                <a16:creationId xmlns:a16="http://schemas.microsoft.com/office/drawing/2014/main" id="{BFA89B50-E98F-4B45-9288-A57ED4C5070C}"/>
+                <a16:creationId xmlns:a16="http://schemas.microsoft.com/office/drawing/2014/main" id="{78FAC934-9CF7-4D36-8A69-A28FD3A05669}"/>
               </a:ext>
             </a:extLst>
           </p:cNvPr>
@@ -30190,25 +28998,28 @@
         </p:nvSpPr>
         <p:spPr/>
         <p:txBody>
-          <a:bodyPr/>
+          <a:bodyPr>
+            <a:noAutofit/>
+          </a:bodyPr>
           <a:lstStyle/>
           <a:p>
             <a:r>
-              <a:rPr lang="en-US" dirty="0"/>
-              <a:t>Note. Placeholder for notes, sources, and permissions (if needed). “Note.” (including a period) is italicized.</a:t>
+              <a:rPr lang="en-US" i="1" dirty="0"/>
+              <a:t>Note.</a:t>
+            </a:r>
+            <a:r>
+              <a:rPr lang="en-US" dirty="0"/>
+              <a:t> Placeholder for notes, sources, and permissions (if needed). “Note.” (including a period) is italicized.</a:t>
             </a:r>
           </a:p>
         </p:txBody>
       </p:sp>
       <p:sp>
         <p:nvSpPr>
-          <p:cNvPr id="5" name="Text Placeholder 4">
+          <p:cNvPr id="3" name="Slide Number Placeholder 2">
             <a:extLst>
               <a:ext uri="{FF2B5EF4-FFF2-40B4-BE49-F238E27FC236}">
-                <a16:creationId xmlns:a16="http://schemas.microsoft.com/office/drawing/2014/main" id="{9AA24E5D-F2D1-402F-8CE5-67C8E23C4738}"/>
-              </a:ext>
-              <a:ext uri="{C183D7F6-B498-43B3-948B-1728B52AA6E4}">
-                <adec:decorative xmlns:adec="http://schemas.microsoft.com/office/drawing/2017/decorative" val="1"/>
+                <a16:creationId xmlns:a16="http://schemas.microsoft.com/office/drawing/2014/main" id="{F39B6279-A62D-4C12-BD1E-5E9C7D1FB9B2}"/>
               </a:ext>
             </a:extLst>
           </p:cNvPr>
@@ -30216,32 +29027,7 @@
             <a:spLocks noGrp="1"/>
           </p:cNvSpPr>
           <p:nvPr>
-            <p:ph type="body" sz="quarter" idx="20"/>
-          </p:nvPr>
-        </p:nvSpPr>
-        <p:spPr/>
-        <p:txBody>
-          <a:bodyPr/>
-          <a:lstStyle/>
-          <a:p>
-            <a:endParaRPr lang="en-US"/>
-          </a:p>
-        </p:txBody>
-      </p:sp>
-      <p:sp>
-        <p:nvSpPr>
-          <p:cNvPr id="6" name="Slide Number Placeholder 5">
-            <a:extLst>
-              <a:ext uri="{FF2B5EF4-FFF2-40B4-BE49-F238E27FC236}">
-                <a16:creationId xmlns:a16="http://schemas.microsoft.com/office/drawing/2014/main" id="{78C8C7C1-03F9-4DC3-BB48-4E96C08A5D9F}"/>
-              </a:ext>
-            </a:extLst>
-          </p:cNvPr>
-          <p:cNvSpPr>
-            <a:spLocks noGrp="1"/>
-          </p:cNvSpPr>
-          <p:nvPr>
-            <p:ph type="sldNum" sz="quarter" idx="21"/>
+            <p:ph type="sldNum" sz="quarter" idx="18"/>
           </p:nvPr>
         </p:nvSpPr>
         <p:spPr/>
@@ -30258,10 +29044,40 @@
           </a:p>
         </p:txBody>
       </p:sp>
+      <p:pic>
+        <p:nvPicPr>
+          <p:cNvPr id="4" name="Picture 3">
+            <a:extLst>
+              <a:ext uri="{FF2B5EF4-FFF2-40B4-BE49-F238E27FC236}">
+                <a16:creationId xmlns:a16="http://schemas.microsoft.com/office/drawing/2014/main" id="{E0D44335-0616-A139-F7B8-B63A7093444C}"/>
+              </a:ext>
+            </a:extLst>
+          </p:cNvPr>
+          <p:cNvPicPr>
+            <a:picLocks noChangeAspect="1"/>
+          </p:cNvPicPr>
+          <p:nvPr/>
+        </p:nvPicPr>
+        <p:blipFill>
+          <a:blip r:embed="rId3"/>
+          <a:stretch>
+            <a:fillRect/>
+          </a:stretch>
+        </p:blipFill>
+        <p:spPr>
+          <a:xfrm>
+            <a:off x="584413" y="2399110"/>
+            <a:ext cx="7975174" cy="3748374"/>
+          </a:xfrm>
+          <a:prstGeom prst="rect">
+            <a:avLst/>
+          </a:prstGeom>
+        </p:spPr>
+      </p:pic>
     </p:spTree>
     <p:extLst>
       <p:ext uri="{BB962C8B-B14F-4D97-AF65-F5344CB8AC3E}">
-        <p14:creationId xmlns:p14="http://schemas.microsoft.com/office/powerpoint/2010/main" val="2616861563"/>
+        <p14:creationId xmlns:p14="http://schemas.microsoft.com/office/powerpoint/2010/main" val="4040656998"/>
       </p:ext>
     </p:extLst>
   </p:cSld>
@@ -30290,10 +29106,10 @@
       </p:grpSpPr>
       <p:sp>
         <p:nvSpPr>
-          <p:cNvPr id="9" name="Title 8">
+          <p:cNvPr id="2" name="Title 1">
             <a:extLst>
               <a:ext uri="{FF2B5EF4-FFF2-40B4-BE49-F238E27FC236}">
-                <a16:creationId xmlns:a16="http://schemas.microsoft.com/office/drawing/2014/main" id="{6D8751F8-5ED5-D644-9EE8-2C57036E82F2}"/>
+                <a16:creationId xmlns:a16="http://schemas.microsoft.com/office/drawing/2014/main" id="{3BEF1F76-1F30-4FC5-9F64-7E7087DBC567}"/>
               </a:ext>
             </a:extLst>
           </p:cNvPr>
@@ -30311,17 +29127,48 @@
           <a:p>
             <a:r>
               <a:rPr lang="en-US" dirty="0"/>
-              <a:t>Table Sample Dark</a:t>
+              <a:t>SmartArt Graphic Sample</a:t>
             </a:r>
           </a:p>
         </p:txBody>
       </p:sp>
-      <p:sp>
-        <p:nvSpPr>
-          <p:cNvPr id="14" name="Text Placeholder 13">
+      <p:graphicFrame>
+        <p:nvGraphicFramePr>
+          <p:cNvPr id="18" name="Content Placeholder 8" descr="Sample smart art">
             <a:extLst>
               <a:ext uri="{FF2B5EF4-FFF2-40B4-BE49-F238E27FC236}">
-                <a16:creationId xmlns:a16="http://schemas.microsoft.com/office/drawing/2014/main" id="{24B61984-3FE0-41A7-B118-31274FF75A37}"/>
+                <a16:creationId xmlns:a16="http://schemas.microsoft.com/office/drawing/2014/main" id="{D6FBAF1B-ECA6-4E39-B846-EA3A49C0F151}"/>
+              </a:ext>
+            </a:extLst>
+          </p:cNvPr>
+          <p:cNvGraphicFramePr>
+            <a:graphicFrameLocks noGrp="1"/>
+          </p:cNvGraphicFramePr>
+          <p:nvPr>
+            <p:ph sz="quarter" idx="14"/>
+            <p:extLst>
+              <p:ext uri="{D42A27DB-BD31-4B8C-83A1-F6EECF244321}">
+                <p14:modId xmlns:p14="http://schemas.microsoft.com/office/powerpoint/2010/main" val="1604865220"/>
+              </p:ext>
+            </p:extLst>
+          </p:nvPr>
+        </p:nvGraphicFramePr>
+        <p:xfrm>
+          <a:off x="342900" y="1308100"/>
+          <a:ext cx="8456613" cy="4498975"/>
+        </p:xfrm>
+        <a:graphic>
+          <a:graphicData uri="http://schemas.openxmlformats.org/drawingml/2006/diagram">
+            <dgm:relIds xmlns:dgm="http://schemas.openxmlformats.org/drawingml/2006/diagram" xmlns:r="http://schemas.openxmlformats.org/officeDocument/2006/relationships" r:dm="rId2" r:lo="rId3" r:qs="rId4" r:cs="rId5"/>
+          </a:graphicData>
+        </a:graphic>
+      </p:graphicFrame>
+      <p:sp>
+        <p:nvSpPr>
+          <p:cNvPr id="3" name="Text Placeholder 2">
+            <a:extLst>
+              <a:ext uri="{FF2B5EF4-FFF2-40B4-BE49-F238E27FC236}">
+                <a16:creationId xmlns:a16="http://schemas.microsoft.com/office/drawing/2014/main" id="{FBEA2B53-EA84-43AF-BF11-79FE80AC212D}"/>
               </a:ext>
             </a:extLst>
           </p:cNvPr>
@@ -30337,569 +29184,16 @@
           <a:bodyPr/>
           <a:lstStyle/>
           <a:p>
-            <a:r>
-              <a:rPr lang="en-US" dirty="0"/>
-              <a:t>Table style name: AIR 20XX</a:t>
-            </a:r>
+            <a:endParaRPr lang="en-US"/>
           </a:p>
         </p:txBody>
       </p:sp>
-      <p:graphicFrame>
-        <p:nvGraphicFramePr>
-          <p:cNvPr id="11" name="Table 11">
+      <p:sp>
+        <p:nvSpPr>
+          <p:cNvPr id="6" name="Slide Number Placeholder 5">
             <a:extLst>
               <a:ext uri="{FF2B5EF4-FFF2-40B4-BE49-F238E27FC236}">
-                <a16:creationId xmlns:a16="http://schemas.microsoft.com/office/drawing/2014/main" id="{C687A4A8-AA0B-4B12-9C5A-C6FFC6B789B5}"/>
-              </a:ext>
-            </a:extLst>
-          </p:cNvPr>
-          <p:cNvGraphicFramePr>
-            <a:graphicFrameLocks noGrp="1"/>
-          </p:cNvGraphicFramePr>
-          <p:nvPr>
-            <p:ph sz="quarter" idx="20"/>
-            <p:extLst>
-              <p:ext uri="{D42A27DB-BD31-4B8C-83A1-F6EECF244321}">
-                <p14:modId xmlns:p14="http://schemas.microsoft.com/office/powerpoint/2010/main" val="1949752626"/>
-              </p:ext>
-            </p:extLst>
-          </p:nvPr>
-        </p:nvGraphicFramePr>
-        <p:xfrm>
-          <a:off x="342900" y="2633663"/>
-          <a:ext cx="8458200" cy="1668780"/>
-        </p:xfrm>
-        <a:graphic>
-          <a:graphicData uri="http://schemas.openxmlformats.org/drawingml/2006/table">
-            <a:tbl>
-              <a:tblPr firstRow="1" bandRow="1">
-                <a:tableStyleId>{577794B7-0F68-450A-8CF4-2D9CDB5CE098}</a:tableStyleId>
-              </a:tblPr>
-              <a:tblGrid>
-                <a:gridCol w="1691640">
-                  <a:extLst>
-                    <a:ext uri="{9D8B030D-6E8A-4147-A177-3AD203B41FA5}">
-                      <a16:colId xmlns:a16="http://schemas.microsoft.com/office/drawing/2014/main" val="2900040619"/>
-                    </a:ext>
-                  </a:extLst>
-                </a:gridCol>
-                <a:gridCol w="1691640">
-                  <a:extLst>
-                    <a:ext uri="{9D8B030D-6E8A-4147-A177-3AD203B41FA5}">
-                      <a16:colId xmlns:a16="http://schemas.microsoft.com/office/drawing/2014/main" val="995431178"/>
-                    </a:ext>
-                  </a:extLst>
-                </a:gridCol>
-                <a:gridCol w="1691640">
-                  <a:extLst>
-                    <a:ext uri="{9D8B030D-6E8A-4147-A177-3AD203B41FA5}">
-                      <a16:colId xmlns:a16="http://schemas.microsoft.com/office/drawing/2014/main" val="3776202267"/>
-                    </a:ext>
-                  </a:extLst>
-                </a:gridCol>
-                <a:gridCol w="1691640">
-                  <a:extLst>
-                    <a:ext uri="{9D8B030D-6E8A-4147-A177-3AD203B41FA5}">
-                      <a16:colId xmlns:a16="http://schemas.microsoft.com/office/drawing/2014/main" val="3889425081"/>
-                    </a:ext>
-                  </a:extLst>
-                </a:gridCol>
-                <a:gridCol w="1691640">
-                  <a:extLst>
-                    <a:ext uri="{9D8B030D-6E8A-4147-A177-3AD203B41FA5}">
-                      <a16:colId xmlns:a16="http://schemas.microsoft.com/office/drawing/2014/main" val="2672975955"/>
-                    </a:ext>
-                  </a:extLst>
-                </a:gridCol>
-              </a:tblGrid>
-              <a:tr h="278130">
-                <a:tc>
-                  <a:txBody>
-                    <a:bodyPr/>
-                    <a:lstStyle/>
-                    <a:p>
-                      <a:pPr algn="ctr"/>
-                      <a:r>
-                        <a:rPr lang="en-US" sz="1000" dirty="0"/>
-                        <a:t>Column Heading</a:t>
-                      </a:r>
-                    </a:p>
-                  </a:txBody>
-                  <a:tcPr marL="68580" marR="68580" marT="34290" marB="34290"/>
-                </a:tc>
-                <a:tc>
-                  <a:txBody>
-                    <a:bodyPr/>
-                    <a:lstStyle/>
-                    <a:p>
-                      <a:pPr marL="0" marR="0" lvl="0" indent="0" algn="ctr" defTabSz="914400" rtl="0" eaLnBrk="1" fontAlgn="auto" latinLnBrk="0" hangingPunct="1">
-                        <a:lnSpc>
-                          <a:spcPct val="100000"/>
-                        </a:lnSpc>
-                        <a:spcBef>
-                          <a:spcPts val="0"/>
-                        </a:spcBef>
-                        <a:spcAft>
-                          <a:spcPts val="0"/>
-                        </a:spcAft>
-                        <a:buClrTx/>
-                        <a:buSzTx/>
-                        <a:buFontTx/>
-                        <a:buNone/>
-                        <a:tabLst/>
-                        <a:defRPr/>
-                      </a:pPr>
-                      <a:r>
-                        <a:rPr lang="en-US" sz="1000" dirty="0"/>
-                        <a:t>Column Heading</a:t>
-                      </a:r>
-                    </a:p>
-                  </a:txBody>
-                  <a:tcPr marL="68580" marR="68580" marT="34290" marB="34290"/>
-                </a:tc>
-                <a:tc>
-                  <a:txBody>
-                    <a:bodyPr/>
-                    <a:lstStyle/>
-                    <a:p>
-                      <a:pPr algn="ctr"/>
-                      <a:r>
-                        <a:rPr lang="en-US" sz="1000" dirty="0"/>
-                        <a:t>Column Heading</a:t>
-                      </a:r>
-                    </a:p>
-                  </a:txBody>
-                  <a:tcPr marL="68580" marR="68580" marT="34290" marB="34290"/>
-                </a:tc>
-                <a:tc>
-                  <a:txBody>
-                    <a:bodyPr/>
-                    <a:lstStyle/>
-                    <a:p>
-                      <a:pPr algn="ctr"/>
-                      <a:r>
-                        <a:rPr lang="en-US" sz="1000" dirty="0"/>
-                        <a:t>Column Heading</a:t>
-                      </a:r>
-                    </a:p>
-                  </a:txBody>
-                  <a:tcPr marL="68580" marR="68580" marT="34290" marB="34290"/>
-                </a:tc>
-                <a:tc>
-                  <a:txBody>
-                    <a:bodyPr/>
-                    <a:lstStyle/>
-                    <a:p>
-                      <a:pPr algn="ctr"/>
-                      <a:r>
-                        <a:rPr lang="en-US" sz="1000" dirty="0"/>
-                        <a:t>Column Heading</a:t>
-                      </a:r>
-                    </a:p>
-                  </a:txBody>
-                  <a:tcPr marL="68580" marR="68580" marT="34290" marB="34290"/>
-                </a:tc>
-                <a:extLst>
-                  <a:ext uri="{0D108BD9-81ED-4DB2-BD59-A6C34878D82A}">
-                    <a16:rowId xmlns:a16="http://schemas.microsoft.com/office/drawing/2014/main" val="342783319"/>
-                  </a:ext>
-                </a:extLst>
-              </a:tr>
-              <a:tr h="278130">
-                <a:tc>
-                  <a:txBody>
-                    <a:bodyPr/>
-                    <a:lstStyle/>
-                    <a:p>
-                      <a:pPr lvl="1"/>
-                      <a:r>
-                        <a:rPr lang="en-US" sz="1000" dirty="0"/>
-                        <a:t>Text</a:t>
-                      </a:r>
-                    </a:p>
-                  </a:txBody>
-                  <a:tcPr marL="68580" marR="68580" marT="34290" marB="34290"/>
-                </a:tc>
-                <a:tc>
-                  <a:txBody>
-                    <a:bodyPr/>
-                    <a:lstStyle/>
-                    <a:p>
-                      <a:pPr lvl="1"/>
-                      <a:r>
-                        <a:rPr lang="en-US" sz="1000" dirty="0"/>
-                        <a:t>Text</a:t>
-                      </a:r>
-                    </a:p>
-                  </a:txBody>
-                  <a:tcPr marL="68580" marR="68580" marT="34290" marB="34290"/>
-                </a:tc>
-                <a:tc>
-                  <a:txBody>
-                    <a:bodyPr/>
-                    <a:lstStyle/>
-                    <a:p>
-                      <a:pPr lvl="1"/>
-                      <a:r>
-                        <a:rPr lang="en-US" sz="1000" dirty="0"/>
-                        <a:t>Text</a:t>
-                      </a:r>
-                    </a:p>
-                  </a:txBody>
-                  <a:tcPr marL="68580" marR="68580" marT="34290" marB="34290"/>
-                </a:tc>
-                <a:tc>
-                  <a:txBody>
-                    <a:bodyPr/>
-                    <a:lstStyle/>
-                    <a:p>
-                      <a:pPr lvl="1"/>
-                      <a:r>
-                        <a:rPr lang="en-US" sz="1000" dirty="0"/>
-                        <a:t>Text</a:t>
-                      </a:r>
-                    </a:p>
-                  </a:txBody>
-                  <a:tcPr marL="68580" marR="68580" marT="34290" marB="34290"/>
-                </a:tc>
-                <a:tc>
-                  <a:txBody>
-                    <a:bodyPr/>
-                    <a:lstStyle/>
-                    <a:p>
-                      <a:pPr lvl="1"/>
-                      <a:r>
-                        <a:rPr lang="en-US" sz="1000" dirty="0"/>
-                        <a:t>Text</a:t>
-                      </a:r>
-                    </a:p>
-                  </a:txBody>
-                  <a:tcPr marL="68580" marR="68580" marT="34290" marB="34290"/>
-                </a:tc>
-                <a:extLst>
-                  <a:ext uri="{0D108BD9-81ED-4DB2-BD59-A6C34878D82A}">
-                    <a16:rowId xmlns:a16="http://schemas.microsoft.com/office/drawing/2014/main" val="4012697678"/>
-                  </a:ext>
-                </a:extLst>
-              </a:tr>
-              <a:tr h="278130">
-                <a:tc>
-                  <a:txBody>
-                    <a:bodyPr/>
-                    <a:lstStyle/>
-                    <a:p>
-                      <a:pPr lvl="1"/>
-                      <a:r>
-                        <a:rPr lang="en-US" sz="1000" dirty="0"/>
-                        <a:t>Text</a:t>
-                      </a:r>
-                    </a:p>
-                  </a:txBody>
-                  <a:tcPr marL="68580" marR="68580" marT="34290" marB="34290"/>
-                </a:tc>
-                <a:tc>
-                  <a:txBody>
-                    <a:bodyPr/>
-                    <a:lstStyle/>
-                    <a:p>
-                      <a:pPr lvl="1"/>
-                      <a:r>
-                        <a:rPr lang="en-US" sz="1000" dirty="0"/>
-                        <a:t>Text</a:t>
-                      </a:r>
-                    </a:p>
-                  </a:txBody>
-                  <a:tcPr marL="68580" marR="68580" marT="34290" marB="34290"/>
-                </a:tc>
-                <a:tc>
-                  <a:txBody>
-                    <a:bodyPr/>
-                    <a:lstStyle/>
-                    <a:p>
-                      <a:pPr lvl="1"/>
-                      <a:r>
-                        <a:rPr lang="en-US" sz="1000" dirty="0"/>
-                        <a:t>Text</a:t>
-                      </a:r>
-                    </a:p>
-                  </a:txBody>
-                  <a:tcPr marL="68580" marR="68580" marT="34290" marB="34290"/>
-                </a:tc>
-                <a:tc>
-                  <a:txBody>
-                    <a:bodyPr/>
-                    <a:lstStyle/>
-                    <a:p>
-                      <a:pPr lvl="1"/>
-                      <a:r>
-                        <a:rPr lang="en-US" sz="1000" dirty="0"/>
-                        <a:t>Text</a:t>
-                      </a:r>
-                    </a:p>
-                  </a:txBody>
-                  <a:tcPr marL="68580" marR="68580" marT="34290" marB="34290"/>
-                </a:tc>
-                <a:tc>
-                  <a:txBody>
-                    <a:bodyPr/>
-                    <a:lstStyle/>
-                    <a:p>
-                      <a:pPr lvl="1"/>
-                      <a:r>
-                        <a:rPr lang="en-US" sz="1000" dirty="0"/>
-                        <a:t>Text</a:t>
-                      </a:r>
-                    </a:p>
-                  </a:txBody>
-                  <a:tcPr marL="68580" marR="68580" marT="34290" marB="34290"/>
-                </a:tc>
-                <a:extLst>
-                  <a:ext uri="{0D108BD9-81ED-4DB2-BD59-A6C34878D82A}">
-                    <a16:rowId xmlns:a16="http://schemas.microsoft.com/office/drawing/2014/main" val="1996372710"/>
-                  </a:ext>
-                </a:extLst>
-              </a:tr>
-              <a:tr h="278130">
-                <a:tc>
-                  <a:txBody>
-                    <a:bodyPr/>
-                    <a:lstStyle/>
-                    <a:p>
-                      <a:pPr lvl="1"/>
-                      <a:r>
-                        <a:rPr lang="en-US" sz="1000" dirty="0"/>
-                        <a:t>Text</a:t>
-                      </a:r>
-                    </a:p>
-                  </a:txBody>
-                  <a:tcPr marL="68580" marR="68580" marT="34290" marB="34290"/>
-                </a:tc>
-                <a:tc>
-                  <a:txBody>
-                    <a:bodyPr/>
-                    <a:lstStyle/>
-                    <a:p>
-                      <a:pPr lvl="1"/>
-                      <a:r>
-                        <a:rPr lang="en-US" sz="1000" dirty="0"/>
-                        <a:t>Text</a:t>
-                      </a:r>
-                    </a:p>
-                  </a:txBody>
-                  <a:tcPr marL="68580" marR="68580" marT="34290" marB="34290"/>
-                </a:tc>
-                <a:tc>
-                  <a:txBody>
-                    <a:bodyPr/>
-                    <a:lstStyle/>
-                    <a:p>
-                      <a:pPr lvl="1"/>
-                      <a:r>
-                        <a:rPr lang="en-US" sz="1000" dirty="0"/>
-                        <a:t>Text</a:t>
-                      </a:r>
-                    </a:p>
-                  </a:txBody>
-                  <a:tcPr marL="68580" marR="68580" marT="34290" marB="34290"/>
-                </a:tc>
-                <a:tc>
-                  <a:txBody>
-                    <a:bodyPr/>
-                    <a:lstStyle/>
-                    <a:p>
-                      <a:pPr lvl="1"/>
-                      <a:r>
-                        <a:rPr lang="en-US" sz="1000" dirty="0"/>
-                        <a:t>Text</a:t>
-                      </a:r>
-                    </a:p>
-                  </a:txBody>
-                  <a:tcPr marL="68580" marR="68580" marT="34290" marB="34290"/>
-                </a:tc>
-                <a:tc>
-                  <a:txBody>
-                    <a:bodyPr/>
-                    <a:lstStyle/>
-                    <a:p>
-                      <a:pPr lvl="1"/>
-                      <a:r>
-                        <a:rPr lang="en-US" sz="1000" dirty="0"/>
-                        <a:t>Text</a:t>
-                      </a:r>
-                    </a:p>
-                  </a:txBody>
-                  <a:tcPr marL="68580" marR="68580" marT="34290" marB="34290"/>
-                </a:tc>
-                <a:extLst>
-                  <a:ext uri="{0D108BD9-81ED-4DB2-BD59-A6C34878D82A}">
-                    <a16:rowId xmlns:a16="http://schemas.microsoft.com/office/drawing/2014/main" val="4000000599"/>
-                  </a:ext>
-                </a:extLst>
-              </a:tr>
-              <a:tr h="278130">
-                <a:tc>
-                  <a:txBody>
-                    <a:bodyPr/>
-                    <a:lstStyle/>
-                    <a:p>
-                      <a:pPr lvl="1"/>
-                      <a:r>
-                        <a:rPr lang="en-US" sz="1000" dirty="0"/>
-                        <a:t>Text</a:t>
-                      </a:r>
-                    </a:p>
-                  </a:txBody>
-                  <a:tcPr marL="68580" marR="68580" marT="34290" marB="34290"/>
-                </a:tc>
-                <a:tc>
-                  <a:txBody>
-                    <a:bodyPr/>
-                    <a:lstStyle/>
-                    <a:p>
-                      <a:pPr lvl="1"/>
-                      <a:r>
-                        <a:rPr lang="en-US" sz="1000" dirty="0"/>
-                        <a:t>Text</a:t>
-                      </a:r>
-                    </a:p>
-                  </a:txBody>
-                  <a:tcPr marL="68580" marR="68580" marT="34290" marB="34290"/>
-                </a:tc>
-                <a:tc>
-                  <a:txBody>
-                    <a:bodyPr/>
-                    <a:lstStyle/>
-                    <a:p>
-                      <a:pPr lvl="1"/>
-                      <a:r>
-                        <a:rPr lang="en-US" sz="1000" dirty="0"/>
-                        <a:t>Text</a:t>
-                      </a:r>
-                    </a:p>
-                  </a:txBody>
-                  <a:tcPr marL="68580" marR="68580" marT="34290" marB="34290"/>
-                </a:tc>
-                <a:tc>
-                  <a:txBody>
-                    <a:bodyPr/>
-                    <a:lstStyle/>
-                    <a:p>
-                      <a:pPr lvl="1"/>
-                      <a:r>
-                        <a:rPr lang="en-US" sz="1000" dirty="0"/>
-                        <a:t>Text</a:t>
-                      </a:r>
-                    </a:p>
-                  </a:txBody>
-                  <a:tcPr marL="68580" marR="68580" marT="34290" marB="34290"/>
-                </a:tc>
-                <a:tc>
-                  <a:txBody>
-                    <a:bodyPr/>
-                    <a:lstStyle/>
-                    <a:p>
-                      <a:pPr lvl="1"/>
-                      <a:r>
-                        <a:rPr lang="en-US" sz="1000" dirty="0"/>
-                        <a:t>Text</a:t>
-                      </a:r>
-                    </a:p>
-                  </a:txBody>
-                  <a:tcPr marL="68580" marR="68580" marT="34290" marB="34290"/>
-                </a:tc>
-                <a:extLst>
-                  <a:ext uri="{0D108BD9-81ED-4DB2-BD59-A6C34878D82A}">
-                    <a16:rowId xmlns:a16="http://schemas.microsoft.com/office/drawing/2014/main" val="2432733508"/>
-                  </a:ext>
-                </a:extLst>
-              </a:tr>
-              <a:tr h="278130">
-                <a:tc>
-                  <a:txBody>
-                    <a:bodyPr/>
-                    <a:lstStyle/>
-                    <a:p>
-                      <a:pPr lvl="1"/>
-                      <a:r>
-                        <a:rPr lang="en-US" sz="1000" dirty="0"/>
-                        <a:t>Text</a:t>
-                      </a:r>
-                    </a:p>
-                  </a:txBody>
-                  <a:tcPr marL="68580" marR="68580" marT="34290" marB="34290"/>
-                </a:tc>
-                <a:tc>
-                  <a:txBody>
-                    <a:bodyPr/>
-                    <a:lstStyle/>
-                    <a:p>
-                      <a:pPr lvl="1"/>
-                      <a:r>
-                        <a:rPr lang="en-US" sz="1000" dirty="0"/>
-                        <a:t>Text</a:t>
-                      </a:r>
-                    </a:p>
-                  </a:txBody>
-                  <a:tcPr marL="68580" marR="68580" marT="34290" marB="34290"/>
-                </a:tc>
-                <a:tc>
-                  <a:txBody>
-                    <a:bodyPr/>
-                    <a:lstStyle/>
-                    <a:p>
-                      <a:pPr lvl="1"/>
-                      <a:r>
-                        <a:rPr lang="en-US" sz="1000" dirty="0"/>
-                        <a:t>Text</a:t>
-                      </a:r>
-                    </a:p>
-                  </a:txBody>
-                  <a:tcPr marL="68580" marR="68580" marT="34290" marB="34290"/>
-                </a:tc>
-                <a:tc>
-                  <a:txBody>
-                    <a:bodyPr/>
-                    <a:lstStyle/>
-                    <a:p>
-                      <a:pPr lvl="1"/>
-                      <a:r>
-                        <a:rPr lang="en-US" sz="1000" dirty="0"/>
-                        <a:t>Text</a:t>
-                      </a:r>
-                    </a:p>
-                  </a:txBody>
-                  <a:tcPr marL="68580" marR="68580" marT="34290" marB="34290"/>
-                </a:tc>
-                <a:tc>
-                  <a:txBody>
-                    <a:bodyPr/>
-                    <a:lstStyle/>
-                    <a:p>
-                      <a:pPr lvl="1"/>
-                      <a:r>
-                        <a:rPr lang="en-US" sz="1000" dirty="0"/>
-                        <a:t>Text</a:t>
-                      </a:r>
-                    </a:p>
-                  </a:txBody>
-                  <a:tcPr marL="68580" marR="68580" marT="34290" marB="34290"/>
-                </a:tc>
-                <a:extLst>
-                  <a:ext uri="{0D108BD9-81ED-4DB2-BD59-A6C34878D82A}">
-                    <a16:rowId xmlns:a16="http://schemas.microsoft.com/office/drawing/2014/main" val="1085258267"/>
-                  </a:ext>
-                </a:extLst>
-              </a:tr>
-            </a:tbl>
-          </a:graphicData>
-        </a:graphic>
-      </p:graphicFrame>
-      <p:sp>
-        <p:nvSpPr>
-          <p:cNvPr id="6" name="Text Placeholder 5">
-            <a:extLst>
-              <a:ext uri="{FF2B5EF4-FFF2-40B4-BE49-F238E27FC236}">
-                <a16:creationId xmlns:a16="http://schemas.microsoft.com/office/drawing/2014/main" id="{81F4AC26-99B1-44C9-B2A2-6534E9548D78}"/>
+                <a16:creationId xmlns:a16="http://schemas.microsoft.com/office/drawing/2014/main" id="{DFD0E49C-3829-4596-AAD6-866121162E78}"/>
               </a:ext>
             </a:extLst>
           </p:cNvPr>
@@ -30907,7 +29201,7 @@
             <a:spLocks noGrp="1"/>
           </p:cNvSpPr>
           <p:nvPr>
-            <p:ph type="body" sz="quarter" idx="14"/>
+            <p:ph type="sldNum" sz="quarter" idx="18"/>
           </p:nvPr>
         </p:nvSpPr>
         <p:spPr/>
@@ -30915,37 +29209,8 @@
           <a:bodyPr/>
           <a:lstStyle/>
           <a:p>
-            <a:r>
-              <a:rPr lang="en-US" dirty="0"/>
-              <a:t>Note. Placeholder for notes, sources, and permissions (if needed). “Note.” (including a period) is italicized.</a:t>
-            </a:r>
-          </a:p>
-        </p:txBody>
-      </p:sp>
-      <p:sp>
-        <p:nvSpPr>
-          <p:cNvPr id="4" name="Slide Number Placeholder 3">
-            <a:extLst>
-              <a:ext uri="{FF2B5EF4-FFF2-40B4-BE49-F238E27FC236}">
-                <a16:creationId xmlns:a16="http://schemas.microsoft.com/office/drawing/2014/main" id="{9327184B-ABB4-4470-8294-3E7BAB86F114}"/>
-              </a:ext>
-            </a:extLst>
-          </p:cNvPr>
-          <p:cNvSpPr>
-            <a:spLocks noGrp="1"/>
-          </p:cNvSpPr>
-          <p:nvPr>
-            <p:ph type="sldNum" sz="quarter" idx="21"/>
-          </p:nvPr>
-        </p:nvSpPr>
-        <p:spPr/>
-        <p:txBody>
-          <a:bodyPr/>
-          <a:lstStyle/>
-          <a:p>
-            <a:fld id="{7E1341B0-7904-4148-9082-6535FE1E4D20}" type="slidenum">
+            <a:fld id="{0C96756F-8C7A-477C-A377-38AED61BD106}" type="slidenum">
               <a:rPr lang="en-US" smtClean="0"/>
-              <a:pPr/>
               <a:t>13</a:t>
             </a:fld>
             <a:endParaRPr lang="en-US" dirty="0"/>
@@ -30955,7 +29220,7 @@
     </p:spTree>
     <p:extLst>
       <p:ext uri="{BB962C8B-B14F-4D97-AF65-F5344CB8AC3E}">
-        <p14:creationId xmlns:p14="http://schemas.microsoft.com/office/powerpoint/2010/main" val="2329634097"/>
+        <p14:creationId xmlns:p14="http://schemas.microsoft.com/office/powerpoint/2010/main" val="1687533577"/>
       </p:ext>
     </p:extLst>
   </p:cSld>
@@ -30987,147 +29252,10 @@
           <p:cNvPr id="2" name="Title 1">
             <a:extLst>
               <a:ext uri="{FF2B5EF4-FFF2-40B4-BE49-F238E27FC236}">
-                <a16:creationId xmlns:a16="http://schemas.microsoft.com/office/drawing/2014/main" id="{3BEF1F76-1F30-4FC5-9F64-7E7087DBC567}"/>
+                <a16:creationId xmlns:a16="http://schemas.microsoft.com/office/drawing/2014/main" id="{C89DBA57-6688-4108-A0F9-CAA742F90FE7}"/>
               </a:ext>
             </a:extLst>
           </p:cNvPr>
-          <p:cNvSpPr>
-            <a:spLocks noGrp="1"/>
-          </p:cNvSpPr>
-          <p:nvPr>
-            <p:ph type="title"/>
-          </p:nvPr>
-        </p:nvSpPr>
-        <p:spPr/>
-        <p:txBody>
-          <a:bodyPr/>
-          <a:lstStyle/>
-          <a:p>
-            <a:r>
-              <a:rPr lang="en-US" dirty="0"/>
-              <a:t>SmartArt Graphic Sample</a:t>
-            </a:r>
-          </a:p>
-        </p:txBody>
-      </p:sp>
-      <p:graphicFrame>
-        <p:nvGraphicFramePr>
-          <p:cNvPr id="18" name="Content Placeholder 8" descr="Sample smart art">
-            <a:extLst>
-              <a:ext uri="{FF2B5EF4-FFF2-40B4-BE49-F238E27FC236}">
-                <a16:creationId xmlns:a16="http://schemas.microsoft.com/office/drawing/2014/main" id="{D6FBAF1B-ECA6-4E39-B846-EA3A49C0F151}"/>
-              </a:ext>
-            </a:extLst>
-          </p:cNvPr>
-          <p:cNvGraphicFramePr>
-            <a:graphicFrameLocks noGrp="1"/>
-          </p:cNvGraphicFramePr>
-          <p:nvPr>
-            <p:ph sz="quarter" idx="14"/>
-            <p:extLst>
-              <p:ext uri="{D42A27DB-BD31-4B8C-83A1-F6EECF244321}">
-                <p14:modId xmlns:p14="http://schemas.microsoft.com/office/powerpoint/2010/main" val="1604865220"/>
-              </p:ext>
-            </p:extLst>
-          </p:nvPr>
-        </p:nvGraphicFramePr>
-        <p:xfrm>
-          <a:off x="342900" y="1308100"/>
-          <a:ext cx="8456613" cy="4498975"/>
-        </p:xfrm>
-        <a:graphic>
-          <a:graphicData uri="http://schemas.openxmlformats.org/drawingml/2006/diagram">
-            <dgm:relIds xmlns:dgm="http://schemas.openxmlformats.org/drawingml/2006/diagram" xmlns:r="http://schemas.openxmlformats.org/officeDocument/2006/relationships" r:dm="rId2" r:lo="rId3" r:qs="rId4" r:cs="rId5"/>
-          </a:graphicData>
-        </a:graphic>
-      </p:graphicFrame>
-      <p:sp>
-        <p:nvSpPr>
-          <p:cNvPr id="3" name="Text Placeholder 2">
-            <a:extLst>
-              <a:ext uri="{FF2B5EF4-FFF2-40B4-BE49-F238E27FC236}">
-                <a16:creationId xmlns:a16="http://schemas.microsoft.com/office/drawing/2014/main" id="{FBEA2B53-EA84-43AF-BF11-79FE80AC212D}"/>
-              </a:ext>
-            </a:extLst>
-          </p:cNvPr>
-          <p:cNvSpPr>
-            <a:spLocks noGrp="1"/>
-          </p:cNvSpPr>
-          <p:nvPr>
-            <p:ph type="body" sz="quarter" idx="17"/>
-          </p:nvPr>
-        </p:nvSpPr>
-        <p:spPr/>
-        <p:txBody>
-          <a:bodyPr/>
-          <a:lstStyle/>
-          <a:p>
-            <a:endParaRPr lang="en-US"/>
-          </a:p>
-        </p:txBody>
-      </p:sp>
-      <p:sp>
-        <p:nvSpPr>
-          <p:cNvPr id="6" name="Slide Number Placeholder 5">
-            <a:extLst>
-              <a:ext uri="{FF2B5EF4-FFF2-40B4-BE49-F238E27FC236}">
-                <a16:creationId xmlns:a16="http://schemas.microsoft.com/office/drawing/2014/main" id="{DFD0E49C-3829-4596-AAD6-866121162E78}"/>
-              </a:ext>
-            </a:extLst>
-          </p:cNvPr>
-          <p:cNvSpPr>
-            <a:spLocks noGrp="1"/>
-          </p:cNvSpPr>
-          <p:nvPr>
-            <p:ph type="sldNum" sz="quarter" idx="18"/>
-          </p:nvPr>
-        </p:nvSpPr>
-        <p:spPr/>
-        <p:txBody>
-          <a:bodyPr/>
-          <a:lstStyle/>
-          <a:p>
-            <a:fld id="{0C96756F-8C7A-477C-A377-38AED61BD106}" type="slidenum">
-              <a:rPr lang="en-US" smtClean="0"/>
-              <a:t>14</a:t>
-            </a:fld>
-            <a:endParaRPr lang="en-US" dirty="0"/>
-          </a:p>
-        </p:txBody>
-      </p:sp>
-    </p:spTree>
-    <p:extLst>
-      <p:ext uri="{BB962C8B-B14F-4D97-AF65-F5344CB8AC3E}">
-        <p14:creationId xmlns:p14="http://schemas.microsoft.com/office/powerpoint/2010/main" val="1687533577"/>
-      </p:ext>
-    </p:extLst>
-  </p:cSld>
-  <p:clrMapOvr>
-    <a:masterClrMapping/>
-  </p:clrMapOvr>
-</p:sld>
-</file>
-
-<file path=ppt/slides/slide15.xml><?xml version="1.0" encoding="utf-8"?>
-<p:sld xmlns:a="http://schemas.openxmlformats.org/drawingml/2006/main" xmlns:r="http://schemas.openxmlformats.org/officeDocument/2006/relationships" xmlns:p="http://schemas.openxmlformats.org/presentationml/2006/main">
-  <p:cSld>
-    <p:spTree>
-      <p:nvGrpSpPr>
-        <p:cNvPr id="1" name=""/>
-        <p:cNvGrpSpPr/>
-        <p:nvPr/>
-      </p:nvGrpSpPr>
-      <p:grpSpPr>
-        <a:xfrm>
-          <a:off x="0" y="0"/>
-          <a:ext cx="0" cy="0"/>
-          <a:chOff x="0" y="0"/>
-          <a:chExt cx="0" cy="0"/>
-        </a:xfrm>
-      </p:grpSpPr>
-      <p:sp>
-        <p:nvSpPr>
-          <p:cNvPr id="2" name="Title 1"/>
           <p:cNvSpPr>
             <a:spLocks noGrp="1"/>
           </p:cNvSpPr>
@@ -31149,251 +29277,7 @@
           <a:p>
             <a:r>
               <a:rPr lang="en-US" dirty="0"/>
-              <a:t>Three-Color Bar Chart Sample Dark</a:t>
-            </a:r>
-          </a:p>
-        </p:txBody>
-      </p:sp>
-      <p:graphicFrame>
-        <p:nvGraphicFramePr>
-          <p:cNvPr id="10" name="Content Placeholder 9" descr="Sample chart">
-            <a:extLst>
-              <a:ext uri="{FF2B5EF4-FFF2-40B4-BE49-F238E27FC236}">
-                <a16:creationId xmlns:a16="http://schemas.microsoft.com/office/drawing/2014/main" id="{36D9B6FC-42BF-D64A-8F63-104621030B9F}"/>
-              </a:ext>
-            </a:extLst>
-          </p:cNvPr>
-          <p:cNvGraphicFramePr>
-            <a:graphicFrameLocks noGrp="1"/>
-          </p:cNvGraphicFramePr>
-          <p:nvPr>
-            <p:ph sz="quarter" idx="17"/>
-            <p:extLst>
-              <p:ext uri="{D42A27DB-BD31-4B8C-83A1-F6EECF244321}">
-                <p14:modId xmlns:p14="http://schemas.microsoft.com/office/powerpoint/2010/main" val="3255393127"/>
-              </p:ext>
-            </p:extLst>
-          </p:nvPr>
-        </p:nvGraphicFramePr>
-        <p:xfrm>
-          <a:off x="342900" y="1308100"/>
-          <a:ext cx="8456613" cy="4498975"/>
-        </p:xfrm>
-        <a:graphic>
-          <a:graphicData uri="http://schemas.openxmlformats.org/drawingml/2006/chart">
-            <c:chart xmlns:c="http://schemas.openxmlformats.org/drawingml/2006/chart" xmlns:r="http://schemas.openxmlformats.org/officeDocument/2006/relationships" r:id="rId3"/>
-          </a:graphicData>
-        </a:graphic>
-      </p:graphicFrame>
-      <p:sp>
-        <p:nvSpPr>
-          <p:cNvPr id="8" name="Text Placeholder 7">
-            <a:extLst>
-              <a:ext uri="{FF2B5EF4-FFF2-40B4-BE49-F238E27FC236}">
-                <a16:creationId xmlns:a16="http://schemas.microsoft.com/office/drawing/2014/main" id="{71539300-F666-4464-ABF2-7049CA90A1FF}"/>
-              </a:ext>
-            </a:extLst>
-          </p:cNvPr>
-          <p:cNvSpPr>
-            <a:spLocks noGrp="1"/>
-          </p:cNvSpPr>
-          <p:nvPr>
-            <p:ph type="body" sz="quarter" idx="14"/>
-          </p:nvPr>
-        </p:nvSpPr>
-        <p:spPr/>
-        <p:txBody>
-          <a:bodyPr>
-            <a:noAutofit/>
-          </a:bodyPr>
-          <a:lstStyle/>
-          <a:p>
-            <a:r>
-              <a:rPr lang="en-US" dirty="0"/>
-              <a:t>Note. Placeholder for notes, sources, and permissions (if needed). “Note.” (including a period) is italicized.</a:t>
-            </a:r>
-          </a:p>
-        </p:txBody>
-      </p:sp>
-      <p:sp>
-        <p:nvSpPr>
-          <p:cNvPr id="4" name="Slide Number Placeholder 3">
-            <a:extLst>
-              <a:ext uri="{FF2B5EF4-FFF2-40B4-BE49-F238E27FC236}">
-                <a16:creationId xmlns:a16="http://schemas.microsoft.com/office/drawing/2014/main" id="{7EE682F3-9DB5-43EC-881C-3F249598DCC9}"/>
-              </a:ext>
-            </a:extLst>
-          </p:cNvPr>
-          <p:cNvSpPr>
-            <a:spLocks noGrp="1"/>
-          </p:cNvSpPr>
-          <p:nvPr>
-            <p:ph type="sldNum" sz="quarter" idx="18"/>
-          </p:nvPr>
-        </p:nvSpPr>
-        <p:spPr/>
-        <p:txBody>
-          <a:bodyPr/>
-          <a:lstStyle/>
-          <a:p>
-            <a:fld id="{7E1341B0-7904-4148-9082-6535FE1E4D20}" type="slidenum">
-              <a:rPr lang="en-US" smtClean="0"/>
-              <a:pPr/>
-              <a:t>15</a:t>
-            </a:fld>
-            <a:endParaRPr lang="en-US" dirty="0"/>
-          </a:p>
-        </p:txBody>
-      </p:sp>
-    </p:spTree>
-    <p:extLst>
-      <p:ext uri="{BB962C8B-B14F-4D97-AF65-F5344CB8AC3E}">
-        <p14:creationId xmlns:p14="http://schemas.microsoft.com/office/powerpoint/2010/main" val="290358487"/>
-      </p:ext>
-    </p:extLst>
-  </p:cSld>
-  <p:clrMapOvr>
-    <a:masterClrMapping/>
-  </p:clrMapOvr>
-</p:sld>
-</file>
-
-<file path=ppt/slides/slide16.xml><?xml version="1.0" encoding="utf-8"?>
-<p:sld xmlns:a="http://schemas.openxmlformats.org/drawingml/2006/main" xmlns:r="http://schemas.openxmlformats.org/officeDocument/2006/relationships" xmlns:p="http://schemas.openxmlformats.org/presentationml/2006/main">
-  <p:cSld>
-    <p:spTree>
-      <p:nvGrpSpPr>
-        <p:cNvPr id="1" name=""/>
-        <p:cNvGrpSpPr/>
-        <p:nvPr/>
-      </p:nvGrpSpPr>
-      <p:grpSpPr>
-        <a:xfrm>
-          <a:off x="0" y="0"/>
-          <a:ext cx="0" cy="0"/>
-          <a:chOff x="0" y="0"/>
-          <a:chExt cx="0" cy="0"/>
-        </a:xfrm>
-      </p:grpSpPr>
-      <p:sp>
-        <p:nvSpPr>
-          <p:cNvPr id="2" name="Title 1">
-            <a:extLst>
-              <a:ext uri="{FF2B5EF4-FFF2-40B4-BE49-F238E27FC236}">
-                <a16:creationId xmlns:a16="http://schemas.microsoft.com/office/drawing/2014/main" id="{A554C18B-515A-48CC-8A4F-CDD301CA6CB5}"/>
-              </a:ext>
-            </a:extLst>
-          </p:cNvPr>
-          <p:cNvSpPr>
-            <a:spLocks noGrp="1"/>
-          </p:cNvSpPr>
-          <p:nvPr>
-            <p:ph type="title"/>
-          </p:nvPr>
-        </p:nvSpPr>
-        <p:spPr/>
-        <p:txBody>
-          <a:bodyPr/>
-          <a:lstStyle/>
-          <a:p>
-            <a:r>
-              <a:rPr lang="en-US" dirty="0"/>
-              <a:t>Title Only Layout Dark</a:t>
-            </a:r>
-          </a:p>
-        </p:txBody>
-      </p:sp>
-      <p:sp>
-        <p:nvSpPr>
-          <p:cNvPr id="4" name="Slide Number Placeholder 3">
-            <a:extLst>
-              <a:ext uri="{FF2B5EF4-FFF2-40B4-BE49-F238E27FC236}">
-                <a16:creationId xmlns:a16="http://schemas.microsoft.com/office/drawing/2014/main" id="{C29C5FC0-E198-460F-B1D1-C15EB2196963}"/>
-              </a:ext>
-            </a:extLst>
-          </p:cNvPr>
-          <p:cNvSpPr>
-            <a:spLocks noGrp="1"/>
-          </p:cNvSpPr>
-          <p:nvPr>
-            <p:ph type="sldNum" sz="quarter" idx="10"/>
-          </p:nvPr>
-        </p:nvSpPr>
-        <p:spPr/>
-        <p:txBody>
-          <a:bodyPr/>
-          <a:lstStyle/>
-          <a:p>
-            <a:fld id="{7E1341B0-7904-4148-9082-6535FE1E4D20}" type="slidenum">
-              <a:rPr lang="en-US" smtClean="0"/>
-              <a:pPr/>
-              <a:t>16</a:t>
-            </a:fld>
-            <a:endParaRPr lang="en-US" dirty="0"/>
-          </a:p>
-        </p:txBody>
-      </p:sp>
-    </p:spTree>
-    <p:extLst>
-      <p:ext uri="{BB962C8B-B14F-4D97-AF65-F5344CB8AC3E}">
-        <p14:creationId xmlns:p14="http://schemas.microsoft.com/office/powerpoint/2010/main" val="788338294"/>
-      </p:ext>
-    </p:extLst>
-  </p:cSld>
-  <p:clrMapOvr>
-    <a:masterClrMapping/>
-  </p:clrMapOvr>
-</p:sld>
-</file>
-
-<file path=ppt/slides/slide17.xml><?xml version="1.0" encoding="utf-8"?>
-<p:sld xmlns:a="http://schemas.openxmlformats.org/drawingml/2006/main" xmlns:r="http://schemas.openxmlformats.org/officeDocument/2006/relationships" xmlns:p="http://schemas.openxmlformats.org/presentationml/2006/main">
-  <p:cSld>
-    <p:spTree>
-      <p:nvGrpSpPr>
-        <p:cNvPr id="1" name=""/>
-        <p:cNvGrpSpPr/>
-        <p:nvPr/>
-      </p:nvGrpSpPr>
-      <p:grpSpPr>
-        <a:xfrm>
-          <a:off x="0" y="0"/>
-          <a:ext cx="0" cy="0"/>
-          <a:chOff x="0" y="0"/>
-          <a:chExt cx="0" cy="0"/>
-        </a:xfrm>
-      </p:grpSpPr>
-      <p:sp>
-        <p:nvSpPr>
-          <p:cNvPr id="2" name="Title 1">
-            <a:extLst>
-              <a:ext uri="{FF2B5EF4-FFF2-40B4-BE49-F238E27FC236}">
-                <a16:creationId xmlns:a16="http://schemas.microsoft.com/office/drawing/2014/main" id="{C89DBA57-6688-4108-A0F9-CAA742F90FE7}"/>
-              </a:ext>
-            </a:extLst>
-          </p:cNvPr>
-          <p:cNvSpPr>
-            <a:spLocks noGrp="1"/>
-          </p:cNvSpPr>
-          <p:nvPr>
-            <p:ph type="title"/>
-          </p:nvPr>
-        </p:nvSpPr>
-        <p:spPr>
-          <a:solidFill>
-            <a:srgbClr val="FFFFFF"/>
-          </a:solidFill>
-          <a:ln/>
-        </p:spPr>
-        <p:txBody>
-          <a:bodyPr>
-            <a:normAutofit/>
-          </a:bodyPr>
-          <a:lstStyle/>
-          <a:p>
-            <a:r>
-              <a:rPr lang="en-US" dirty="0"/>
-              <a:t>References Layout Dark</a:t>
+              <a:t>References</a:t>
             </a:r>
           </a:p>
         </p:txBody>
@@ -31518,280 +29402,6 @@
               <a:t> Publishing Firm.</a:t>
             </a:r>
           </a:p>
-          <a:p>
-            <a:r>
-              <a:rPr lang="en-US" sz="1350" i="0" kern="1200" baseline="0" dirty="0">
-                <a:solidFill>
-                  <a:srgbClr val="1C252D"/>
-                </a:solidFill>
-                <a:effectLst/>
-                <a:latin typeface="+mn-lt"/>
-                <a:ea typeface="+mn-ea"/>
-                <a:cs typeface="Arial" panose="020B0604020202020204" pitchFamily="34" charset="0"/>
-              </a:rPr>
-              <a:t>Author Last Name, First Initial. Middle Initial. (Year). </a:t>
-            </a:r>
-            <a:r>
-              <a:rPr lang="en-US" sz="1350" i="1" kern="1200" baseline="0" dirty="0">
-                <a:solidFill>
-                  <a:srgbClr val="1C252D"/>
-                </a:solidFill>
-                <a:effectLst/>
-                <a:latin typeface="+mn-lt"/>
-                <a:ea typeface="+mn-ea"/>
-                <a:cs typeface="Arial" panose="020B0604020202020204" pitchFamily="34" charset="0"/>
-              </a:rPr>
-              <a:t>Report title</a:t>
-            </a:r>
-            <a:r>
-              <a:rPr lang="en-US" sz="1350" i="0" kern="1200" baseline="0" dirty="0">
-                <a:solidFill>
-                  <a:srgbClr val="1C252D"/>
-                </a:solidFill>
-                <a:effectLst/>
-                <a:latin typeface="+mn-lt"/>
-                <a:ea typeface="+mn-ea"/>
-                <a:cs typeface="Arial" panose="020B0604020202020204" pitchFamily="34" charset="0"/>
-              </a:rPr>
-              <a:t> (Report Number). Publishing Firm.</a:t>
-            </a:r>
-          </a:p>
-          <a:p>
-            <a:r>
-              <a:rPr lang="en-US" sz="1350" i="0" kern="1200" baseline="0" dirty="0">
-                <a:solidFill>
-                  <a:srgbClr val="1C252D"/>
-                </a:solidFill>
-                <a:effectLst/>
-                <a:latin typeface="+mn-lt"/>
-                <a:ea typeface="+mn-ea"/>
-                <a:cs typeface="Arial" panose="020B0604020202020204" pitchFamily="34" charset="0"/>
-              </a:rPr>
-              <a:t>Grady, J. S., Her, M., Moreno, G., Perez, C., &amp; Yelinek, J. (2019). Emotions in storybooks: A comparison of storybooks that represent ethnic and racial groups in the United States. </a:t>
-            </a:r>
-            <a:r>
-              <a:rPr lang="en-US" sz="1350" i="1" kern="1200" baseline="0" dirty="0">
-                <a:solidFill>
-                  <a:srgbClr val="1C252D"/>
-                </a:solidFill>
-                <a:effectLst/>
-                <a:latin typeface="+mn-lt"/>
-                <a:ea typeface="+mn-ea"/>
-                <a:cs typeface="Arial" panose="020B0604020202020204" pitchFamily="34" charset="0"/>
-              </a:rPr>
-              <a:t>Psychology of Popular Media Culture, 8</a:t>
-            </a:r>
-            <a:r>
-              <a:rPr lang="en-US" sz="1350" i="0" kern="1200" baseline="0" dirty="0">
-                <a:solidFill>
-                  <a:srgbClr val="1C252D"/>
-                </a:solidFill>
-                <a:effectLst/>
-                <a:latin typeface="+mn-lt"/>
-                <a:ea typeface="+mn-ea"/>
-                <a:cs typeface="Arial" panose="020B0604020202020204" pitchFamily="34" charset="0"/>
-              </a:rPr>
-              <a:t>(3), 207–217. </a:t>
-            </a:r>
-            <a:r>
-              <a:rPr lang="en-US" sz="1350" i="0" u="sng" kern="1200" baseline="0" dirty="0">
-                <a:solidFill>
-                  <a:srgbClr val="1C252D"/>
-                </a:solidFill>
-                <a:effectLst/>
-                <a:latin typeface="+mn-lt"/>
-                <a:ea typeface="+mn-ea"/>
-                <a:cs typeface="Arial" panose="020B0604020202020204" pitchFamily="34" charset="0"/>
-              </a:rPr>
-              <a:t>https://doi.org/10.1037/ppm0000185</a:t>
-            </a:r>
-            <a:endParaRPr lang="en-US" sz="1350" i="0" kern="1200" baseline="0" dirty="0">
-              <a:solidFill>
-                <a:srgbClr val="1C252D"/>
-              </a:solidFill>
-              <a:effectLst/>
-              <a:latin typeface="+mn-lt"/>
-              <a:ea typeface="+mn-ea"/>
-              <a:cs typeface="Arial" panose="020B0604020202020204" pitchFamily="34" charset="0"/>
-            </a:endParaRPr>
-          </a:p>
-          <a:p>
-            <a:r>
-              <a:rPr lang="en-US" sz="1350" i="0" kern="1200" baseline="0" dirty="0">
-                <a:solidFill>
-                  <a:srgbClr val="1C252D"/>
-                </a:solidFill>
-                <a:effectLst/>
-                <a:latin typeface="+mn-lt"/>
-                <a:ea typeface="+mn-ea"/>
-                <a:cs typeface="Arial" panose="020B0604020202020204" pitchFamily="34" charset="0"/>
-              </a:rPr>
-              <a:t>Jackson, L. M. (2019). </a:t>
-            </a:r>
-            <a:r>
-              <a:rPr lang="en-US" sz="1350" i="1" kern="1200" baseline="0" dirty="0">
-                <a:solidFill>
-                  <a:srgbClr val="1C252D"/>
-                </a:solidFill>
-                <a:effectLst/>
-                <a:latin typeface="+mn-lt"/>
-                <a:ea typeface="+mn-ea"/>
-                <a:cs typeface="Arial" panose="020B0604020202020204" pitchFamily="34" charset="0"/>
-              </a:rPr>
-              <a:t>The psychology of prejudice: From attitudes to social action</a:t>
-            </a:r>
-            <a:r>
-              <a:rPr lang="en-US" sz="1350" i="0" kern="1200" baseline="0" dirty="0">
-                <a:solidFill>
-                  <a:srgbClr val="1C252D"/>
-                </a:solidFill>
-                <a:effectLst/>
-                <a:latin typeface="+mn-lt"/>
-                <a:ea typeface="+mn-ea"/>
-                <a:cs typeface="Arial" panose="020B0604020202020204" pitchFamily="34" charset="0"/>
-              </a:rPr>
-              <a:t> (2nd ed.). American Psychological Association. </a:t>
-            </a:r>
-            <a:r>
-              <a:rPr lang="en-US" sz="1350" i="0" u="sng" kern="1200" baseline="0" dirty="0">
-                <a:solidFill>
-                  <a:srgbClr val="1C252D"/>
-                </a:solidFill>
-                <a:effectLst/>
-                <a:latin typeface="+mn-lt"/>
-                <a:ea typeface="+mn-ea"/>
-                <a:cs typeface="Arial" panose="020B0604020202020204" pitchFamily="34" charset="0"/>
-              </a:rPr>
-              <a:t>https://doi.org/10.1037/0000168-000</a:t>
-            </a:r>
-            <a:endParaRPr lang="en-US" sz="1350" i="0" kern="1200" baseline="0" dirty="0">
-              <a:solidFill>
-                <a:srgbClr val="1C252D"/>
-              </a:solidFill>
-              <a:effectLst/>
-              <a:latin typeface="+mn-lt"/>
-              <a:ea typeface="+mn-ea"/>
-              <a:cs typeface="Arial" panose="020B0604020202020204" pitchFamily="34" charset="0"/>
-            </a:endParaRPr>
-          </a:p>
-          <a:p>
-            <a:r>
-              <a:rPr lang="en-US" sz="1350" i="0" kern="1200" baseline="0" dirty="0">
-                <a:solidFill>
-                  <a:srgbClr val="1C252D"/>
-                </a:solidFill>
-                <a:effectLst/>
-                <a:latin typeface="+mn-lt"/>
-                <a:ea typeface="+mn-ea"/>
-                <a:cs typeface="Arial" panose="020B0604020202020204" pitchFamily="34" charset="0"/>
-              </a:rPr>
-              <a:t>National Cancer Institute. (2019). </a:t>
-            </a:r>
-            <a:r>
-              <a:rPr lang="en-US" sz="1350" i="1" kern="1200" baseline="0" dirty="0">
-                <a:solidFill>
-                  <a:srgbClr val="1C252D"/>
-                </a:solidFill>
-                <a:effectLst/>
-                <a:latin typeface="+mn-lt"/>
-                <a:ea typeface="+mn-ea"/>
-                <a:cs typeface="Arial" panose="020B0604020202020204" pitchFamily="34" charset="0"/>
-              </a:rPr>
-              <a:t>Taking time: Support for people with cancer</a:t>
-            </a:r>
-            <a:r>
-              <a:rPr lang="en-US" sz="1350" i="0" kern="1200" baseline="0" dirty="0">
-                <a:solidFill>
-                  <a:srgbClr val="1C252D"/>
-                </a:solidFill>
-                <a:effectLst/>
-                <a:latin typeface="+mn-lt"/>
-                <a:ea typeface="+mn-ea"/>
-                <a:cs typeface="Arial" panose="020B0604020202020204" pitchFamily="34" charset="0"/>
-              </a:rPr>
-              <a:t> (NIH Publication No. 18-2059). U.S. Department of Health and Human Services, National Institutes of Health. </a:t>
-            </a:r>
-            <a:r>
-              <a:rPr lang="en-US" sz="1350" i="0" u="sng" kern="1200" baseline="0" dirty="0">
-                <a:solidFill>
-                  <a:srgbClr val="1C252D"/>
-                </a:solidFill>
-                <a:effectLst/>
-                <a:latin typeface="+mn-lt"/>
-                <a:ea typeface="+mn-ea"/>
-                <a:cs typeface="Arial" panose="020B0604020202020204" pitchFamily="34" charset="0"/>
-              </a:rPr>
-              <a:t>https://www.cancer.gov/publications/patient-education/takingtime.pdf</a:t>
-            </a:r>
-            <a:endParaRPr lang="en-US" sz="1350" i="0" kern="1200" baseline="0" dirty="0">
-              <a:solidFill>
-                <a:srgbClr val="1C252D"/>
-              </a:solidFill>
-              <a:effectLst/>
-              <a:latin typeface="+mn-lt"/>
-              <a:ea typeface="+mn-ea"/>
-              <a:cs typeface="Arial" panose="020B0604020202020204" pitchFamily="34" charset="0"/>
-            </a:endParaRPr>
-          </a:p>
-          <a:p>
-            <a:r>
-              <a:rPr lang="en-US" sz="1350" i="0" kern="1200" baseline="0" dirty="0">
-                <a:solidFill>
-                  <a:srgbClr val="1C252D"/>
-                </a:solidFill>
-                <a:effectLst/>
-                <a:latin typeface="+mn-lt"/>
-                <a:ea typeface="+mn-ea"/>
-                <a:cs typeface="Arial" panose="020B0604020202020204" pitchFamily="34" charset="0"/>
-              </a:rPr>
-              <a:t>Stuster, J., Adolf, J., Byrne, V., &amp; Greene, M. (2018). </a:t>
-            </a:r>
-            <a:r>
-              <a:rPr lang="en-US" sz="1350" i="1" kern="1200" baseline="0" dirty="0">
-                <a:solidFill>
-                  <a:srgbClr val="1C252D"/>
-                </a:solidFill>
-                <a:effectLst/>
-                <a:latin typeface="+mn-lt"/>
-                <a:ea typeface="+mn-ea"/>
-                <a:cs typeface="Arial" panose="020B0604020202020204" pitchFamily="34" charset="0"/>
-              </a:rPr>
-              <a:t>Human exploration of Mars: Preliminary lists of crew tasks</a:t>
-            </a:r>
-            <a:r>
-              <a:rPr lang="en-US" sz="1350" i="0" kern="1200" baseline="0" dirty="0">
-                <a:solidFill>
-                  <a:srgbClr val="1C252D"/>
-                </a:solidFill>
-                <a:effectLst/>
-                <a:latin typeface="+mn-lt"/>
-                <a:ea typeface="+mn-ea"/>
-                <a:cs typeface="Arial" panose="020B0604020202020204" pitchFamily="34" charset="0"/>
-              </a:rPr>
-              <a:t> (Report No. NASA/CR-2018-220043). National Aeronautics and Space Administration. </a:t>
-            </a:r>
-            <a:r>
-              <a:rPr lang="en-US" sz="1350" i="0" u="sng" kern="1200" baseline="0" dirty="0">
-                <a:solidFill>
-                  <a:srgbClr val="1C252D"/>
-                </a:solidFill>
-                <a:effectLst/>
-                <a:latin typeface="+mn-lt"/>
-                <a:ea typeface="+mn-ea"/>
-                <a:cs typeface="Arial" panose="020B0604020202020204" pitchFamily="34" charset="0"/>
-              </a:rPr>
-              <a:t>https://ntrs.nasa.gov/archive/nasa/casi.ntrs.nasa.gov/20190001401.pdf</a:t>
-            </a:r>
-            <a:endParaRPr lang="en-US" sz="1350" i="0" kern="1200" baseline="0" dirty="0">
-              <a:solidFill>
-                <a:srgbClr val="1C252D"/>
-              </a:solidFill>
-              <a:effectLst/>
-              <a:latin typeface="+mn-lt"/>
-              <a:ea typeface="+mn-ea"/>
-              <a:cs typeface="Arial" panose="020B0604020202020204" pitchFamily="34" charset="0"/>
-            </a:endParaRPr>
-          </a:p>
         </p:txBody>
       </p:sp>
       <p:sp>
@@ -31818,7 +29428,7 @@
             <a:fld id="{7E1341B0-7904-4148-9082-6535FE1E4D20}" type="slidenum">
               <a:rPr lang="en-US" smtClean="0"/>
               <a:pPr/>
-              <a:t>17</a:t>
+              <a:t>14</a:t>
             </a:fld>
             <a:endParaRPr lang="en-US" dirty="0"/>
           </a:p>
@@ -31828,197 +29438,6 @@
     <p:extLst>
       <p:ext uri="{BB962C8B-B14F-4D97-AF65-F5344CB8AC3E}">
         <p14:creationId xmlns:p14="http://schemas.microsoft.com/office/powerpoint/2010/main" val="3725530701"/>
-      </p:ext>
-    </p:extLst>
-  </p:cSld>
-  <p:clrMapOvr>
-    <a:masterClrMapping/>
-  </p:clrMapOvr>
-</p:sld>
-</file>
-
-<file path=ppt/slides/slide18.xml><?xml version="1.0" encoding="utf-8"?>
-<p:sld xmlns:a="http://schemas.openxmlformats.org/drawingml/2006/main" xmlns:r="http://schemas.openxmlformats.org/officeDocument/2006/relationships" xmlns:p="http://schemas.openxmlformats.org/presentationml/2006/main">
-  <p:cSld>
-    <p:spTree>
-      <p:nvGrpSpPr>
-        <p:cNvPr id="1" name=""/>
-        <p:cNvGrpSpPr/>
-        <p:nvPr/>
-      </p:nvGrpSpPr>
-      <p:grpSpPr>
-        <a:xfrm>
-          <a:off x="0" y="0"/>
-          <a:ext cx="0" cy="0"/>
-          <a:chOff x="0" y="0"/>
-          <a:chExt cx="0" cy="0"/>
-        </a:xfrm>
-      </p:grpSpPr>
-      <p:sp>
-        <p:nvSpPr>
-          <p:cNvPr id="2" name="Title 1">
-            <a:extLst>
-              <a:ext uri="{FF2B5EF4-FFF2-40B4-BE49-F238E27FC236}">
-                <a16:creationId xmlns:a16="http://schemas.microsoft.com/office/drawing/2014/main" id="{1FDB5BFB-EC3D-9648-9D2D-B528DC3C2E41}"/>
-              </a:ext>
-            </a:extLst>
-          </p:cNvPr>
-          <p:cNvSpPr>
-            <a:spLocks noGrp="1"/>
-          </p:cNvSpPr>
-          <p:nvPr>
-            <p:ph type="ctrTitle"/>
-          </p:nvPr>
-        </p:nvSpPr>
-        <p:spPr/>
-        <p:txBody>
-          <a:bodyPr/>
-          <a:lstStyle/>
-          <a:p>
-            <a:r>
-              <a:rPr lang="en-US" dirty="0"/>
-              <a:t>Presenter’s Name Dark</a:t>
-            </a:r>
-          </a:p>
-        </p:txBody>
-      </p:sp>
-      <p:sp>
-        <p:nvSpPr>
-          <p:cNvPr id="3" name="Subtitle 2">
-            <a:extLst>
-              <a:ext uri="{FF2B5EF4-FFF2-40B4-BE49-F238E27FC236}">
-                <a16:creationId xmlns:a16="http://schemas.microsoft.com/office/drawing/2014/main" id="{083F5EB6-9F04-B249-B8E7-99D8BEF4163B}"/>
-              </a:ext>
-            </a:extLst>
-          </p:cNvPr>
-          <p:cNvSpPr>
-            <a:spLocks noGrp="1"/>
-          </p:cNvSpPr>
-          <p:nvPr>
-            <p:ph type="subTitle" idx="1"/>
-          </p:nvPr>
-        </p:nvSpPr>
-        <p:spPr/>
-        <p:txBody>
-          <a:bodyPr/>
-          <a:lstStyle/>
-          <a:p>
-            <a:pPr lvl="0"/>
-            <a:r>
-              <a:rPr lang="en-US" dirty="0"/>
-              <a:t>Presenter’s Job Title</a:t>
-            </a:r>
-            <a:br>
-              <a:rPr lang="en-US" dirty="0"/>
-            </a:br>
-            <a:r>
-              <a:rPr lang="en-US" dirty="0"/>
-              <a:t>+1.202.403.XXXX</a:t>
-            </a:r>
-            <a:br>
-              <a:rPr lang="en-US" dirty="0"/>
-            </a:br>
-            <a:r>
-              <a:rPr lang="en-US" dirty="0"/>
-              <a:t>email.address@air.org or internal.group.email@air.org</a:t>
-            </a:r>
-          </a:p>
-        </p:txBody>
-      </p:sp>
-      <p:sp>
-        <p:nvSpPr>
-          <p:cNvPr id="9" name="Text Placeholder 8">
-            <a:extLst>
-              <a:ext uri="{FF2B5EF4-FFF2-40B4-BE49-F238E27FC236}">
-                <a16:creationId xmlns:a16="http://schemas.microsoft.com/office/drawing/2014/main" id="{90B207C8-84C0-47BB-A77B-8AB0F1129C73}"/>
-              </a:ext>
-            </a:extLst>
-          </p:cNvPr>
-          <p:cNvSpPr>
-            <a:spLocks noGrp="1"/>
-          </p:cNvSpPr>
-          <p:nvPr>
-            <p:ph type="body" sz="quarter" idx="10"/>
-          </p:nvPr>
-        </p:nvSpPr>
-        <p:spPr/>
-        <p:txBody>
-          <a:bodyPr/>
-          <a:lstStyle/>
-          <a:p>
-            <a:r>
-              <a:rPr lang="en-US" dirty="0"/>
-              <a:t>XXXXX_MO/YR</a:t>
-            </a:r>
-          </a:p>
-        </p:txBody>
-      </p:sp>
-      <p:sp>
-        <p:nvSpPr>
-          <p:cNvPr id="7" name="Content Placeholder 6">
-            <a:extLst>
-              <a:ext uri="{FF2B5EF4-FFF2-40B4-BE49-F238E27FC236}">
-                <a16:creationId xmlns:a16="http://schemas.microsoft.com/office/drawing/2014/main" id="{D88B16B3-75D8-4DB4-BF0D-E53122271F83}"/>
-              </a:ext>
-            </a:extLst>
-          </p:cNvPr>
-          <p:cNvSpPr>
-            <a:spLocks noGrp="1"/>
-          </p:cNvSpPr>
-          <p:nvPr>
-            <p:ph sz="quarter" idx="15"/>
-          </p:nvPr>
-        </p:nvSpPr>
-        <p:spPr/>
-        <p:txBody>
-          <a:bodyPr/>
-          <a:lstStyle/>
-          <a:p>
-            <a:r>
-              <a:rPr lang="en-US" dirty="0"/>
-              <a:t>AIR Internal Group Name: Subgroup OR SERVICE LINE OR GRANT NAME</a:t>
-            </a:r>
-          </a:p>
-        </p:txBody>
-      </p:sp>
-      <p:sp>
-        <p:nvSpPr>
-          <p:cNvPr id="29" name="Text Placeholder 28">
-            <a:extLst>
-              <a:ext uri="{FF2B5EF4-FFF2-40B4-BE49-F238E27FC236}">
-                <a16:creationId xmlns:a16="http://schemas.microsoft.com/office/drawing/2014/main" id="{727F6D2F-29E1-4FE6-DF44-E025B91833CA}"/>
-              </a:ext>
-            </a:extLst>
-          </p:cNvPr>
-          <p:cNvSpPr>
-            <a:spLocks noGrp="1"/>
-          </p:cNvSpPr>
-          <p:nvPr>
-            <p:ph type="body" sz="quarter" idx="16"/>
-          </p:nvPr>
-        </p:nvSpPr>
-        <p:spPr/>
-        <p:txBody>
-          <a:bodyPr/>
-          <a:lstStyle/>
-          <a:p>
-            <a:r>
-              <a:rPr lang="en-US" dirty="0"/>
-              <a:t>Notice of Trademark: “American Institutes for Research” and “AIR” are registered trademarks. All other brand, product, or company names are trademarks or registered trademarks of their respective owners.</a:t>
-            </a:r>
-          </a:p>
-          <a:p>
-            <a:r>
-              <a:rPr lang="en-US" dirty="0"/>
-              <a:t>Copyright © 20XX American Institutes for Research®. All rights reserved. No part of this publication may be reproduced, distributed, or transmitted in any form or by any means, including photocopying, recording, website display, or other electronic or mechanical methods, without the prior written permission of the American Institutes for Research. For permission requests, please use the Contact Us form on AIR.ORG.</a:t>
-            </a:r>
-          </a:p>
-        </p:txBody>
-      </p:sp>
-    </p:spTree>
-    <p:extLst>
-      <p:ext uri="{BB962C8B-B14F-4D97-AF65-F5344CB8AC3E}">
-        <p14:creationId xmlns:p14="http://schemas.microsoft.com/office/powerpoint/2010/main" val="862728739"/>
       </p:ext>
     </p:extLst>
   </p:cSld>
@@ -33324,10 +30743,16 @@
           <p:cNvGraphicFramePr>
             <a:graphicFrameLocks noGrp="1"/>
           </p:cNvGraphicFramePr>
-          <p:nvPr/>
+          <p:nvPr>
+            <p:extLst>
+              <p:ext uri="{D42A27DB-BD31-4B8C-83A1-F6EECF244321}">
+                <p14:modId xmlns:p14="http://schemas.microsoft.com/office/powerpoint/2010/main" val="4274772559"/>
+              </p:ext>
+            </p:extLst>
+          </p:nvPr>
         </p:nvGraphicFramePr>
         <p:xfrm>
-          <a:off x="887506" y="2949411"/>
+          <a:off x="1522810" y="2949411"/>
           <a:ext cx="6096000" cy="2856865"/>
         </p:xfrm>
         <a:graphic>
@@ -33924,7 +31349,12 @@
             <p:ph sz="quarter" idx="17"/>
           </p:nvPr>
         </p:nvSpPr>
-        <p:spPr/>
+        <p:spPr>
+          <a:xfrm>
+            <a:off x="342902" y="1307592"/>
+            <a:ext cx="3063028" cy="4498848"/>
+          </a:xfrm>
+        </p:spPr>
         <p:txBody>
           <a:bodyPr/>
           <a:lstStyle/>
@@ -33932,8 +31362,16 @@
             <a:pPr lvl="0"/>
             <a:r>
               <a:rPr lang="en-US" dirty="0"/>
-              <a:t>No installations required if you have RStudio</a:t>
-            </a:r>
+              <a:t>All you need is:</a:t>
+            </a:r>
+          </a:p>
+          <a:p>
+            <a:pPr lvl="1"/>
+            <a:r>
+              <a:rPr lang="en-US" dirty="0" err="1"/>
+              <a:t>Rstudio</a:t>
+            </a:r>
+            <a:endParaRPr lang="en-US" dirty="0"/>
           </a:p>
           <a:p>
             <a:pPr lvl="0"/>
@@ -34026,6 +31464,66 @@
           </a:p>
         </p:txBody>
       </p:sp>
+      <p:pic>
+        <p:nvPicPr>
+          <p:cNvPr id="4" name="Picture 3" descr="A screenshot of a computer&#10;&#10;Description automatically generated">
+            <a:extLst>
+              <a:ext uri="{FF2B5EF4-FFF2-40B4-BE49-F238E27FC236}">
+                <a16:creationId xmlns:a16="http://schemas.microsoft.com/office/drawing/2014/main" id="{7A9A1A18-431E-CAFD-B5B2-21731455449F}"/>
+              </a:ext>
+            </a:extLst>
+          </p:cNvPr>
+          <p:cNvPicPr>
+            <a:picLocks noChangeAspect="1"/>
+          </p:cNvPicPr>
+          <p:nvPr/>
+        </p:nvPicPr>
+        <p:blipFill>
+          <a:blip r:embed="rId3"/>
+          <a:stretch>
+            <a:fillRect/>
+          </a:stretch>
+        </p:blipFill>
+        <p:spPr>
+          <a:xfrm>
+            <a:off x="3549016" y="3875532"/>
+            <a:ext cx="5593794" cy="1930744"/>
+          </a:xfrm>
+          <a:prstGeom prst="rect">
+            <a:avLst/>
+          </a:prstGeom>
+        </p:spPr>
+      </p:pic>
+      <p:pic>
+        <p:nvPicPr>
+          <p:cNvPr id="7" name="Picture 6" descr="A screenshot of a computer&#10;&#10;Description automatically generated">
+            <a:extLst>
+              <a:ext uri="{FF2B5EF4-FFF2-40B4-BE49-F238E27FC236}">
+                <a16:creationId xmlns:a16="http://schemas.microsoft.com/office/drawing/2014/main" id="{3B37647E-6C4F-AE7D-A063-41AC6257DC2E}"/>
+              </a:ext>
+            </a:extLst>
+          </p:cNvPr>
+          <p:cNvPicPr>
+            <a:picLocks noChangeAspect="1"/>
+          </p:cNvPicPr>
+          <p:nvPr/>
+        </p:nvPicPr>
+        <p:blipFill>
+          <a:blip r:embed="rId4"/>
+          <a:stretch>
+            <a:fillRect/>
+          </a:stretch>
+        </p:blipFill>
+        <p:spPr>
+          <a:xfrm>
+            <a:off x="3549016" y="0"/>
+            <a:ext cx="5594985" cy="3981450"/>
+          </a:xfrm>
+          <a:prstGeom prst="rect">
+            <a:avLst/>
+          </a:prstGeom>
+        </p:spPr>
+      </p:pic>
     </p:spTree>
     <p:extLst>
       <p:ext uri="{BB962C8B-B14F-4D97-AF65-F5344CB8AC3E}">
@@ -34094,7 +31592,12 @@
             <p:ph sz="quarter" idx="17"/>
           </p:nvPr>
         </p:nvSpPr>
-        <p:spPr/>
+        <p:spPr>
+          <a:xfrm>
+            <a:off x="342901" y="1307592"/>
+            <a:ext cx="8455819" cy="588320"/>
+          </a:xfrm>
+        </p:spPr>
         <p:txBody>
           <a:bodyPr/>
           <a:lstStyle/>
@@ -34104,7 +31607,10 @@
               <a:rPr lang="en-US" dirty="0" err="1"/>
               <a:t>reactable</a:t>
             </a:r>
-            <a:endParaRPr lang="en-US" dirty="0"/>
+            <a:r>
+              <a:rPr lang="en-US" dirty="0"/>
+              <a:t> enables Excel-like filtering functionality</a:t>
+            </a:r>
           </a:p>
           <a:p>
             <a:pPr lvl="0"/>
@@ -34176,6 +31682,36 @@
           </a:p>
         </p:txBody>
       </p:sp>
+      <p:pic>
+        <p:nvPicPr>
+          <p:cNvPr id="7" name="Picture 6">
+            <a:extLst>
+              <a:ext uri="{FF2B5EF4-FFF2-40B4-BE49-F238E27FC236}">
+                <a16:creationId xmlns:a16="http://schemas.microsoft.com/office/drawing/2014/main" id="{7CEA4FA5-F2E5-9456-D678-FFA3AA17C067}"/>
+              </a:ext>
+            </a:extLst>
+          </p:cNvPr>
+          <p:cNvPicPr>
+            <a:picLocks noChangeAspect="1"/>
+          </p:cNvPicPr>
+          <p:nvPr/>
+        </p:nvPicPr>
+        <p:blipFill>
+          <a:blip r:embed="rId3"/>
+          <a:stretch>
+            <a:fillRect/>
+          </a:stretch>
+        </p:blipFill>
+        <p:spPr>
+          <a:xfrm>
+            <a:off x="-1190" y="1996275"/>
+            <a:ext cx="9144000" cy="3481607"/>
+          </a:xfrm>
+          <a:prstGeom prst="rect">
+            <a:avLst/>
+          </a:prstGeom>
+        </p:spPr>
+      </p:pic>
     </p:spTree>
     <p:extLst>
       <p:ext uri="{BB962C8B-B14F-4D97-AF65-F5344CB8AC3E}">
@@ -35722,21 +33258,6 @@
 </file>
 
 <file path=customXml/item1.xml><?xml version="1.0" encoding="utf-8"?>
-<p:properties xmlns:p="http://schemas.microsoft.com/office/2006/metadata/properties" xmlns:xsi="http://www.w3.org/2001/XMLSchema-instance" xmlns:pc="http://schemas.microsoft.com/office/infopath/2007/PartnerControls">
-  <documentManagement>
-    <TaxCatchAll xmlns="8ea4f2a2-9e30-484e-8d93-57b3883382ed">
-      <Value>1327</Value>
-    </TaxCatchAll>
-    <Order0 xmlns="5b517dce-de22-4404-baa6-4fedf8b4993e" xsi:nil="true"/>
-    <ItemDescription xmlns="5b517dce-de22-4404-baa6-4fedf8b4993e" xsi:nil="true"/>
-    <lcf76f155ced4ddcb4097134ff3c332f xmlns="5b517dce-de22-4404-baa6-4fedf8b4993e">
-      <Terms xmlns="http://schemas.microsoft.com/office/infopath/2007/PartnerControls"/>
-    </lcf76f155ced4ddcb4097134ff3c332f>
-  </documentManagement>
-</p:properties>
-</file>
-
-<file path=customXml/item2.xml><?xml version="1.0" encoding="utf-8"?>
 <ct:contentTypeSchema xmlns:ct="http://schemas.microsoft.com/office/2006/metadata/contentType" xmlns:ma="http://schemas.microsoft.com/office/2006/metadata/properties/metaAttributes" ct:_="" ma:_="" ma:contentTypeName="Document" ma:contentTypeID="0x01010045FC42B8CC53B94A85F71CE7EEEF034E" ma:contentTypeVersion="15" ma:contentTypeDescription="Create a new document." ma:contentTypeScope="" ma:versionID="1e217615fedb661f8d6b6ede34259bd9">
   <xsd:schema xmlns:xsd="http://www.w3.org/2001/XMLSchema" xmlns:xs="http://www.w3.org/2001/XMLSchema" xmlns:p="http://schemas.microsoft.com/office/2006/metadata/properties" xmlns:ns2="5b517dce-de22-4404-baa6-4fedf8b4993e" xmlns:ns3="8ea4f2a2-9e30-484e-8d93-57b3883382ed" targetNamespace="http://schemas.microsoft.com/office/2006/metadata/properties" ma:root="true" ma:fieldsID="c85ecc4b47884d4533c9cb9ead7ee813" ns2:_="" ns3:_="">
     <xsd:import namespace="5b517dce-de22-4404-baa6-4fedf8b4993e"/>
@@ -35973,6 +33494,21 @@
 </ct:contentTypeSchema>
 </file>
 
+<file path=customXml/item2.xml><?xml version="1.0" encoding="utf-8"?>
+<p:properties xmlns:p="http://schemas.microsoft.com/office/2006/metadata/properties" xmlns:xsi="http://www.w3.org/2001/XMLSchema-instance" xmlns:pc="http://schemas.microsoft.com/office/infopath/2007/PartnerControls">
+  <documentManagement>
+    <TaxCatchAll xmlns="8ea4f2a2-9e30-484e-8d93-57b3883382ed">
+      <Value>1327</Value>
+    </TaxCatchAll>
+    <Order0 xmlns="5b517dce-de22-4404-baa6-4fedf8b4993e" xsi:nil="true"/>
+    <ItemDescription xmlns="5b517dce-de22-4404-baa6-4fedf8b4993e" xsi:nil="true"/>
+    <lcf76f155ced4ddcb4097134ff3c332f xmlns="5b517dce-de22-4404-baa6-4fedf8b4993e">
+      <Terms xmlns="http://schemas.microsoft.com/office/infopath/2007/PartnerControls"/>
+    </lcf76f155ced4ddcb4097134ff3c332f>
+  </documentManagement>
+</p:properties>
+</file>
+
 <file path=customXml/item3.xml><?xml version="1.0" encoding="utf-8"?>
 <?mso-contentType ?>
 <FormTemplates xmlns="http://schemas.microsoft.com/sharepoint/v3/contenttype/forms">
@@ -35983,6 +33519,25 @@
 </file>
 
 <file path=customXml/itemProps1.xml><?xml version="1.0" encoding="utf-8"?>
+<ds:datastoreItem xmlns:ds="http://schemas.openxmlformats.org/officeDocument/2006/customXml" ds:itemID="{41235C53-1EDB-4FE9-A32E-A8061D924B58}">
+  <ds:schemaRefs>
+    <ds:schemaRef ds:uri="http://schemas.microsoft.com/office/2006/metadata/contentType"/>
+    <ds:schemaRef ds:uri="http://schemas.microsoft.com/office/2006/metadata/properties/metaAttributes"/>
+    <ds:schemaRef ds:uri="http://www.w3.org/2001/XMLSchema"/>
+    <ds:schemaRef ds:uri="http://schemas.microsoft.com/office/2006/metadata/properties"/>
+    <ds:schemaRef ds:uri="5b517dce-de22-4404-baa6-4fedf8b4993e"/>
+    <ds:schemaRef ds:uri="8ea4f2a2-9e30-484e-8d93-57b3883382ed"/>
+    <ds:schemaRef ds:uri="http://schemas.microsoft.com/office/2006/documentManagement/types"/>
+    <ds:schemaRef ds:uri="http://schemas.microsoft.com/office/infopath/2007/PartnerControls"/>
+    <ds:schemaRef ds:uri="http://schemas.openxmlformats.org/package/2006/metadata/core-properties"/>
+    <ds:schemaRef ds:uri="http://purl.org/dc/elements/1.1/"/>
+    <ds:schemaRef ds:uri="http://purl.org/dc/terms/"/>
+    <ds:schemaRef ds:uri="http://schemas.microsoft.com/internal/obd"/>
+  </ds:schemaRefs>
+</ds:datastoreItem>
+</file>
+
+<file path=customXml/itemProps2.xml><?xml version="1.0" encoding="utf-8"?>
 <ds:datastoreItem xmlns:ds="http://schemas.openxmlformats.org/officeDocument/2006/customXml" ds:itemID="{91EAC94F-0CB7-47E2-B1CC-A0F105248E94}">
   <ds:schemaRefs>
     <ds:schemaRef ds:uri="http://purl.org/dc/elements/1.1/"/>
@@ -36001,25 +33556,6 @@
 </ds:datastoreItem>
 </file>
 
-<file path=customXml/itemProps2.xml><?xml version="1.0" encoding="utf-8"?>
-<ds:datastoreItem xmlns:ds="http://schemas.openxmlformats.org/officeDocument/2006/customXml" ds:itemID="{41235C53-1EDB-4FE9-A32E-A8061D924B58}">
-  <ds:schemaRefs>
-    <ds:schemaRef ds:uri="http://schemas.microsoft.com/office/2006/metadata/contentType"/>
-    <ds:schemaRef ds:uri="http://schemas.microsoft.com/office/2006/metadata/properties/metaAttributes"/>
-    <ds:schemaRef ds:uri="http://www.w3.org/2001/XMLSchema"/>
-    <ds:schemaRef ds:uri="http://schemas.microsoft.com/office/2006/metadata/properties"/>
-    <ds:schemaRef ds:uri="5b517dce-de22-4404-baa6-4fedf8b4993e"/>
-    <ds:schemaRef ds:uri="8ea4f2a2-9e30-484e-8d93-57b3883382ed"/>
-    <ds:schemaRef ds:uri="http://schemas.microsoft.com/office/2006/documentManagement/types"/>
-    <ds:schemaRef ds:uri="http://schemas.microsoft.com/office/infopath/2007/PartnerControls"/>
-    <ds:schemaRef ds:uri="http://schemas.openxmlformats.org/package/2006/metadata/core-properties"/>
-    <ds:schemaRef ds:uri="http://purl.org/dc/elements/1.1/"/>
-    <ds:schemaRef ds:uri="http://purl.org/dc/terms/"/>
-    <ds:schemaRef ds:uri="http://schemas.microsoft.com/internal/obd"/>
-  </ds:schemaRefs>
-</ds:datastoreItem>
-</file>
-
 <file path=customXml/itemProps3.xml><?xml version="1.0" encoding="utf-8"?>
 <ds:datastoreItem xmlns:ds="http://schemas.openxmlformats.org/officeDocument/2006/customXml" ds:itemID="{F63C77B6-D79C-4692-AE58-9EB660BFA000}">
   <ds:schemaRefs>

</xml_diff>